<commit_message>
Prepare model with differential relapse rates
</commit_message>
<xml_diff>
--- a/docs/Diagnosis unbox 230907.pptx
+++ b/docs/Diagnosis unbox 230907.pptx
@@ -5284,7 +5284,7 @@
           <a:p>
             <a:fld id="{029D6229-E10E-4C76-A75C-B4819F42F1BB}" type="datetimeFigureOut">
               <a:rPr lang="en-GB" smtClean="0"/>
-              <a:t>13/09/2023</a:t>
+              <a:t>15/09/2023</a:t>
             </a:fld>
             <a:endParaRPr lang="en-GB"/>
           </a:p>
@@ -5484,7 +5484,7 @@
           <a:p>
             <a:fld id="{029D6229-E10E-4C76-A75C-B4819F42F1BB}" type="datetimeFigureOut">
               <a:rPr lang="en-GB" smtClean="0"/>
-              <a:t>13/09/2023</a:t>
+              <a:t>15/09/2023</a:t>
             </a:fld>
             <a:endParaRPr lang="en-GB"/>
           </a:p>
@@ -5694,7 +5694,7 @@
           <a:p>
             <a:fld id="{029D6229-E10E-4C76-A75C-B4819F42F1BB}" type="datetimeFigureOut">
               <a:rPr lang="en-GB" smtClean="0"/>
-              <a:t>13/09/2023</a:t>
+              <a:t>15/09/2023</a:t>
             </a:fld>
             <a:endParaRPr lang="en-GB"/>
           </a:p>
@@ -5894,7 +5894,7 @@
           <a:p>
             <a:fld id="{029D6229-E10E-4C76-A75C-B4819F42F1BB}" type="datetimeFigureOut">
               <a:rPr lang="en-GB" smtClean="0"/>
-              <a:t>13/09/2023</a:t>
+              <a:t>15/09/2023</a:t>
             </a:fld>
             <a:endParaRPr lang="en-GB"/>
           </a:p>
@@ -6170,7 +6170,7 @@
           <a:p>
             <a:fld id="{029D6229-E10E-4C76-A75C-B4819F42F1BB}" type="datetimeFigureOut">
               <a:rPr lang="en-GB" smtClean="0"/>
-              <a:t>13/09/2023</a:t>
+              <a:t>15/09/2023</a:t>
             </a:fld>
             <a:endParaRPr lang="en-GB"/>
           </a:p>
@@ -6438,7 +6438,7 @@
           <a:p>
             <a:fld id="{029D6229-E10E-4C76-A75C-B4819F42F1BB}" type="datetimeFigureOut">
               <a:rPr lang="en-GB" smtClean="0"/>
-              <a:t>13/09/2023</a:t>
+              <a:t>15/09/2023</a:t>
             </a:fld>
             <a:endParaRPr lang="en-GB"/>
           </a:p>
@@ -6853,7 +6853,7 @@
           <a:p>
             <a:fld id="{029D6229-E10E-4C76-A75C-B4819F42F1BB}" type="datetimeFigureOut">
               <a:rPr lang="en-GB" smtClean="0"/>
-              <a:t>13/09/2023</a:t>
+              <a:t>15/09/2023</a:t>
             </a:fld>
             <a:endParaRPr lang="en-GB"/>
           </a:p>
@@ -6995,7 +6995,7 @@
           <a:p>
             <a:fld id="{029D6229-E10E-4C76-A75C-B4819F42F1BB}" type="datetimeFigureOut">
               <a:rPr lang="en-GB" smtClean="0"/>
-              <a:t>13/09/2023</a:t>
+              <a:t>15/09/2023</a:t>
             </a:fld>
             <a:endParaRPr lang="en-GB"/>
           </a:p>
@@ -7108,7 +7108,7 @@
           <a:p>
             <a:fld id="{029D6229-E10E-4C76-A75C-B4819F42F1BB}" type="datetimeFigureOut">
               <a:rPr lang="en-GB" smtClean="0"/>
-              <a:t>13/09/2023</a:t>
+              <a:t>15/09/2023</a:t>
             </a:fld>
             <a:endParaRPr lang="en-GB"/>
           </a:p>
@@ -7421,7 +7421,7 @@
           <a:p>
             <a:fld id="{029D6229-E10E-4C76-A75C-B4819F42F1BB}" type="datetimeFigureOut">
               <a:rPr lang="en-GB" smtClean="0"/>
-              <a:t>13/09/2023</a:t>
+              <a:t>15/09/2023</a:t>
             </a:fld>
             <a:endParaRPr lang="en-GB"/>
           </a:p>
@@ -7710,7 +7710,7 @@
           <a:p>
             <a:fld id="{029D6229-E10E-4C76-A75C-B4819F42F1BB}" type="datetimeFigureOut">
               <a:rPr lang="en-GB" smtClean="0"/>
-              <a:t>13/09/2023</a:t>
+              <a:t>15/09/2023</a:t>
             </a:fld>
             <a:endParaRPr lang="en-GB"/>
           </a:p>
@@ -7953,7 +7953,7 @@
           <a:p>
             <a:fld id="{029D6229-E10E-4C76-A75C-B4819F42F1BB}" type="datetimeFigureOut">
               <a:rPr lang="en-GB" smtClean="0"/>
-              <a:t>13/09/2023</a:t>
+              <a:t>15/09/2023</a:t>
             </a:fld>
             <a:endParaRPr lang="en-GB"/>
           </a:p>
@@ -38809,7 +38809,13 @@
                           <a:rPr lang="en-GB" sz="1200" b="0" i="1" smtClean="0">
                             <a:latin typeface="Cambria Math" panose="02040503050406030204" pitchFamily="18" charset="0"/>
                           </a:rPr>
-                          <m:t>𝑠𝑝𝑢𝑡𝑢𝑚</m:t>
+                          <m:t>𝑠</m:t>
+                        </m:r>
+                        <m:r>
+                          <a:rPr lang="en-GB" sz="1200" b="0" i="1" smtClean="0">
+                            <a:latin typeface="Cambria Math" panose="02040503050406030204" pitchFamily="18" charset="0"/>
+                          </a:rPr>
+                          <m:t>𝑎𝑚𝑝𝑙𝑒</m:t>
                         </m:r>
                       </m:sub>
                     </m:sSub>
@@ -38851,7 +38857,13 @@
                           <a:rPr lang="en-GB" sz="1200" i="1">
                             <a:latin typeface="Cambria Math" panose="02040503050406030204" pitchFamily="18" charset="0"/>
                           </a:rPr>
-                          <m:t>𝑠𝑝𝑢𝑡𝑢𝑚</m:t>
+                          <m:t>𝑠</m:t>
+                        </m:r>
+                        <m:r>
+                          <a:rPr lang="en-GB" sz="1200" b="0" i="1" smtClean="0">
+                            <a:latin typeface="Cambria Math" panose="02040503050406030204" pitchFamily="18" charset="0"/>
+                          </a:rPr>
+                          <m:t>𝑎𝑚𝑝𝑙𝑒</m:t>
                         </m:r>
                       </m:sub>
                     </m:sSub>
@@ -38966,7 +38978,7 @@
             </p:nvSpPr>
             <p:spPr>
               <a:xfrm>
-                <a:off x="5639926" y="354821"/>
+                <a:off x="5585522" y="327061"/>
                 <a:ext cx="1744654" cy="291298"/>
               </a:xfrm>
               <a:prstGeom prst="rect">
@@ -39008,7 +39020,13 @@
                           <a:rPr lang="en-GB" sz="1200" i="1">
                             <a:latin typeface="Cambria Math" panose="02040503050406030204" pitchFamily="18" charset="0"/>
                           </a:rPr>
-                          <m:t>𝑠𝑝𝑢𝑡𝑢𝑚</m:t>
+                          <m:t>𝑠</m:t>
+                        </m:r>
+                        <m:r>
+                          <a:rPr lang="en-GB" sz="1200" b="0" i="1" smtClean="0">
+                            <a:latin typeface="Cambria Math" panose="02040503050406030204" pitchFamily="18" charset="0"/>
+                          </a:rPr>
+                          <m:t>𝑎𝑚𝑝𝑙𝑒</m:t>
                         </m:r>
                       </m:sub>
                     </m:sSub>
@@ -39067,7 +39085,7 @@
             </p:nvSpPr>
             <p:spPr>
               <a:xfrm>
-                <a:off x="5639926" y="354821"/>
+                <a:off x="5585522" y="327061"/>
                 <a:ext cx="1744654" cy="291298"/>
               </a:xfrm>
               <a:prstGeom prst="rect">
@@ -39076,7 +39094,7 @@
               <a:blipFill>
                 <a:blip r:embed="rId3"/>
                 <a:stretch>
-                  <a:fillRect b="-12500"/>
+                  <a:fillRect b="-14894"/>
                 </a:stretch>
               </a:blipFill>
             </p:spPr>
@@ -39138,8 +39156,8 @@
           </a:fontRef>
         </p:style>
       </p:cxnSp>
-      <mc:AlternateContent xmlns:mc="http://schemas.openxmlformats.org/markup-compatibility/2006">
-        <mc:Choice xmlns:a14="http://schemas.microsoft.com/office/drawing/2010/main" Requires="a14">
+      <mc:AlternateContent xmlns:mc="http://schemas.openxmlformats.org/markup-compatibility/2006" xmlns:a14="http://schemas.microsoft.com/office/drawing/2010/main">
+        <mc:Choice Requires="a14">
           <p:sp>
             <p:nvSpPr>
               <p:cNvPr id="600" name="TextBox 599">
@@ -39208,7 +39226,7 @@
             </p:txBody>
           </p:sp>
         </mc:Choice>
-        <mc:Fallback>
+        <mc:Fallback xmlns="">
           <p:sp>
             <p:nvSpPr>
               <p:cNvPr id="600" name="TextBox 599">
@@ -39253,8 +39271,8 @@
           </p:sp>
         </mc:Fallback>
       </mc:AlternateContent>
-      <mc:AlternateContent xmlns:mc="http://schemas.openxmlformats.org/markup-compatibility/2006">
-        <mc:Choice xmlns:a14="http://schemas.microsoft.com/office/drawing/2010/main" Requires="a14">
+      <mc:AlternateContent xmlns:mc="http://schemas.openxmlformats.org/markup-compatibility/2006" xmlns:a14="http://schemas.microsoft.com/office/drawing/2010/main">
+        <mc:Choice Requires="a14">
           <p:sp>
             <p:nvSpPr>
               <p:cNvPr id="601" name="TextBox 600">
@@ -39286,7 +39304,7 @@
                 <a:pPr algn="ctr"/>
                 <a:r>
                   <a:rPr lang="en-US" sz="1200" dirty="0"/>
-                  <a:t>Incorrect patient management: </a:t>
+                  <a:t>Fail to suspect TB: </a:t>
                 </a:r>
                 <a14:m>
                   <m:oMath xmlns:m="http://schemas.openxmlformats.org/officeDocument/2006/math">
@@ -39334,7 +39352,7 @@
             </p:txBody>
           </p:sp>
         </mc:Choice>
-        <mc:Fallback>
+        <mc:Fallback xmlns="">
           <p:sp>
             <p:nvSpPr>
               <p:cNvPr id="601" name="TextBox 600">
@@ -39379,8 +39397,8 @@
           </p:sp>
         </mc:Fallback>
       </mc:AlternateContent>
-      <mc:AlternateContent xmlns:mc="http://schemas.openxmlformats.org/markup-compatibility/2006">
-        <mc:Choice xmlns:a14="http://schemas.microsoft.com/office/drawing/2010/main" Requires="a14">
+      <mc:AlternateContent xmlns:mc="http://schemas.openxmlformats.org/markup-compatibility/2006" xmlns:a14="http://schemas.microsoft.com/office/drawing/2010/main">
+        <mc:Choice Requires="a14">
           <p:sp>
             <p:nvSpPr>
               <p:cNvPr id="602" name="TextBox 601">
@@ -39449,7 +39467,7 @@
             </p:txBody>
           </p:sp>
         </mc:Choice>
-        <mc:Fallback>
+        <mc:Fallback xmlns="">
           <p:sp>
             <p:nvSpPr>
               <p:cNvPr id="602" name="TextBox 601">
@@ -39494,8 +39512,8 @@
           </p:sp>
         </mc:Fallback>
       </mc:AlternateContent>
-      <mc:AlternateContent xmlns:mc="http://schemas.openxmlformats.org/markup-compatibility/2006">
-        <mc:Choice xmlns:a14="http://schemas.microsoft.com/office/drawing/2010/main" Requires="a14">
+      <mc:AlternateContent xmlns:mc="http://schemas.openxmlformats.org/markup-compatibility/2006" xmlns:a14="http://schemas.microsoft.com/office/drawing/2010/main">
+        <mc:Choice Requires="a14">
           <p:sp>
             <p:nvSpPr>
               <p:cNvPr id="604" name="TextBox 603">
@@ -39527,7 +39545,7 @@
                 <a:pPr algn="ctr"/>
                 <a:r>
                   <a:rPr lang="en-US" sz="1200" dirty="0"/>
-                  <a:t>Test positive: </a:t>
+                  <a:t>Positive: </a:t>
                 </a:r>
                 <a14:m>
                   <m:oMath xmlns:m="http://schemas.openxmlformats.org/officeDocument/2006/math">
@@ -39563,7 +39581,7 @@
             </p:txBody>
           </p:sp>
         </mc:Choice>
-        <mc:Fallback>
+        <mc:Fallback xmlns="">
           <p:sp>
             <p:nvSpPr>
               <p:cNvPr id="604" name="TextBox 603">
@@ -39608,8 +39626,8 @@
           </p:sp>
         </mc:Fallback>
       </mc:AlternateContent>
-      <mc:AlternateContent xmlns:mc="http://schemas.openxmlformats.org/markup-compatibility/2006">
-        <mc:Choice xmlns:a14="http://schemas.microsoft.com/office/drawing/2010/main" Requires="a14">
+      <mc:AlternateContent xmlns:mc="http://schemas.openxmlformats.org/markup-compatibility/2006" xmlns:a14="http://schemas.microsoft.com/office/drawing/2010/main">
+        <mc:Choice Requires="a14">
           <p:sp>
             <p:nvSpPr>
               <p:cNvPr id="613" name="TextBox 612">
@@ -39684,7 +39702,7 @@
             </p:txBody>
           </p:sp>
         </mc:Choice>
-        <mc:Fallback>
+        <mc:Fallback xmlns="">
           <p:sp>
             <p:nvSpPr>
               <p:cNvPr id="613" name="TextBox 612">
@@ -39729,8 +39747,8 @@
           </p:sp>
         </mc:Fallback>
       </mc:AlternateContent>
-      <mc:AlternateContent xmlns:mc="http://schemas.openxmlformats.org/markup-compatibility/2006">
-        <mc:Choice xmlns:a14="http://schemas.microsoft.com/office/drawing/2010/main" Requires="a14">
+      <mc:AlternateContent xmlns:mc="http://schemas.openxmlformats.org/markup-compatibility/2006" xmlns:a14="http://schemas.microsoft.com/office/drawing/2010/main">
+        <mc:Choice Requires="a14">
           <p:sp>
             <p:nvSpPr>
               <p:cNvPr id="614" name="TextBox 613">
@@ -39805,7 +39823,7 @@
             </p:txBody>
           </p:sp>
         </mc:Choice>
-        <mc:Fallback>
+        <mc:Fallback xmlns="">
           <p:sp>
             <p:nvSpPr>
               <p:cNvPr id="614" name="TextBox 613">
@@ -39933,8 +39951,8 @@
           </a:fontRef>
         </p:style>
       </p:cxnSp>
-      <mc:AlternateContent xmlns:mc="http://schemas.openxmlformats.org/markup-compatibility/2006">
-        <mc:Choice xmlns:a14="http://schemas.microsoft.com/office/drawing/2010/main" Requires="a14">
+      <mc:AlternateContent xmlns:mc="http://schemas.openxmlformats.org/markup-compatibility/2006" xmlns:a14="http://schemas.microsoft.com/office/drawing/2010/main">
+        <mc:Choice Requires="a14">
           <p:sp>
             <p:nvSpPr>
               <p:cNvPr id="27" name="TextBox 26">
@@ -39950,7 +39968,7 @@
             <p:spPr>
               <a:xfrm>
                 <a:off x="2716112" y="1996077"/>
-                <a:ext cx="2060395" cy="276999"/>
+                <a:ext cx="2575555" cy="276999"/>
               </a:xfrm>
               <a:prstGeom prst="rect">
                 <a:avLst/>
@@ -39965,7 +39983,15 @@
               <a:p>
                 <a:r>
                   <a:rPr lang="en-US" sz="1200" dirty="0"/>
-                  <a:t>Test unavailable: </a:t>
+                  <a:t>Test unavailable/</a:t>
+                </a:r>
+                <a:r>
+                  <a:rPr lang="en-US" sz="1200" dirty="0" err="1"/>
+                  <a:t>unutilised</a:t>
+                </a:r>
+                <a:r>
+                  <a:rPr lang="en-US" sz="1200" dirty="0"/>
+                  <a:t>: </a:t>
                 </a:r>
                 <a14:m>
                   <m:oMath xmlns:m="http://schemas.openxmlformats.org/officeDocument/2006/math">
@@ -40013,7 +40039,7 @@
             </p:txBody>
           </p:sp>
         </mc:Choice>
-        <mc:Fallback>
+        <mc:Fallback xmlns="">
           <p:sp>
             <p:nvSpPr>
               <p:cNvPr id="27" name="TextBox 26">
@@ -40031,7 +40057,7 @@
             <p:spPr>
               <a:xfrm>
                 <a:off x="2716112" y="1996077"/>
-                <a:ext cx="2060395" cy="276999"/>
+                <a:ext cx="2575555" cy="276999"/>
               </a:xfrm>
               <a:prstGeom prst="rect">
                 <a:avLst/>
@@ -40039,7 +40065,7 @@
               <a:blipFill>
                 <a:blip r:embed="rId10"/>
                 <a:stretch>
-                  <a:fillRect l="-296" b="-15217"/>
+                  <a:fillRect l="-237" b="-15217"/>
                 </a:stretch>
               </a:blipFill>
             </p:spPr>
@@ -40100,8 +40126,8 @@
           </a:fontRef>
         </p:style>
       </p:cxnSp>
-      <mc:AlternateContent xmlns:mc="http://schemas.openxmlformats.org/markup-compatibility/2006">
-        <mc:Choice xmlns:a14="http://schemas.microsoft.com/office/drawing/2010/main" Requires="a14">
+      <mc:AlternateContent xmlns:mc="http://schemas.openxmlformats.org/markup-compatibility/2006" xmlns:a14="http://schemas.microsoft.com/office/drawing/2010/main">
+        <mc:Choice Requires="a14">
           <p:sp>
             <p:nvSpPr>
               <p:cNvPr id="41" name="TextBox 40">
@@ -40133,7 +40159,7 @@
                 <a:pPr algn="ctr"/>
                 <a:r>
                   <a:rPr lang="en-US" sz="1200" dirty="0"/>
-                  <a:t>Test negative: </a:t>
+                  <a:t>Negative: </a:t>
                 </a:r>
                 <a14:m>
                   <m:oMath xmlns:m="http://schemas.openxmlformats.org/officeDocument/2006/math">
@@ -40175,7 +40201,7 @@
             </p:txBody>
           </p:sp>
         </mc:Choice>
-        <mc:Fallback>
+        <mc:Fallback xmlns="">
           <p:sp>
             <p:nvSpPr>
               <p:cNvPr id="41" name="TextBox 40">
@@ -40974,7 +41000,7 @@
         </p:nvSpPr>
         <p:spPr>
           <a:xfrm>
-            <a:off x="4459161" y="4957281"/>
+            <a:off x="4715693" y="4955964"/>
             <a:ext cx="901936" cy="361112"/>
           </a:xfrm>
           <a:prstGeom prst="rect">
@@ -41263,8 +41289,8 @@
         </p:nvCxnSpPr>
         <p:spPr>
           <a:xfrm>
-            <a:off x="5361097" y="5137837"/>
-            <a:ext cx="644764" cy="0"/>
+            <a:off x="5617629" y="5136520"/>
+            <a:ext cx="388232" cy="1317"/>
           </a:xfrm>
           <a:prstGeom prst="straightConnector1">
             <a:avLst/>
@@ -41305,7 +41331,7 @@
         </p:nvCxnSpPr>
         <p:spPr>
           <a:xfrm rot="5400000" flipH="1" flipV="1">
-            <a:off x="6081735" y="3575063"/>
+            <a:off x="6338267" y="3573746"/>
             <a:ext cx="210612" cy="2553825"/>
           </a:xfrm>
           <a:prstGeom prst="bentConnector2">
@@ -41347,9 +41373,9 @@
           <p:nvPr/>
         </p:nvCxnSpPr>
         <p:spPr>
-          <a:xfrm>
-            <a:off x="3895822" y="5137837"/>
-            <a:ext cx="563339" cy="0"/>
+          <a:xfrm flipV="1">
+            <a:off x="3895822" y="5136520"/>
+            <a:ext cx="819871" cy="1317"/>
           </a:xfrm>
           <a:prstGeom prst="straightConnector1">
             <a:avLst/>
@@ -41475,6 +41501,882 @@
         <p:spPr>
           <a:xfrm rot="16200000" flipH="1">
             <a:off x="6870114" y="4905107"/>
+            <a:ext cx="180556" cy="1007127"/>
+          </a:xfrm>
+          <a:prstGeom prst="bentConnector2">
+            <a:avLst/>
+          </a:prstGeom>
+          <a:ln>
+            <a:tailEnd type="triangle"/>
+          </a:ln>
+        </p:spPr>
+        <p:style>
+          <a:lnRef idx="1">
+            <a:schemeClr val="accent2"/>
+          </a:lnRef>
+          <a:fillRef idx="0">
+            <a:schemeClr val="accent2"/>
+          </a:fillRef>
+          <a:effectRef idx="0">
+            <a:schemeClr val="accent2"/>
+          </a:effectRef>
+          <a:fontRef idx="minor">
+            <a:schemeClr val="tx1"/>
+          </a:fontRef>
+        </p:style>
+      </p:cxnSp>
+      <mc:AlternateContent xmlns:mc="http://schemas.openxmlformats.org/markup-compatibility/2006" xmlns:a14="http://schemas.microsoft.com/office/drawing/2010/main">
+        <mc:Choice Requires="a14">
+          <p:sp>
+            <p:nvSpPr>
+              <p:cNvPr id="30" name="TextBox 29">
+                <a:extLst>
+                  <a:ext uri="{FF2B5EF4-FFF2-40B4-BE49-F238E27FC236}">
+                    <a16:creationId xmlns:a16="http://schemas.microsoft.com/office/drawing/2014/main" id="{3C547BD1-0D33-75D0-8B89-8974FC10DBFA}"/>
+                  </a:ext>
+                </a:extLst>
+              </p:cNvPr>
+              <p:cNvSpPr txBox="1"/>
+              <p:nvPr/>
+            </p:nvSpPr>
+            <p:spPr>
+              <a:xfrm>
+                <a:off x="3439009" y="5568593"/>
+                <a:ext cx="1362075" cy="291298"/>
+              </a:xfrm>
+              <a:prstGeom prst="rect">
+                <a:avLst/>
+              </a:prstGeom>
+              <a:noFill/>
+            </p:spPr>
+            <p:txBody>
+              <a:bodyPr wrap="square">
+                <a:spAutoFit/>
+              </a:bodyPr>
+              <a:lstStyle/>
+              <a:p>
+                <a:pPr/>
+                <a14:m>
+                  <m:oMathPara xmlns:m="http://schemas.openxmlformats.org/officeDocument/2006/math">
+                    <m:oMathParaPr>
+                      <m:jc m:val="centerGroup"/>
+                    </m:oMathParaPr>
+                    <m:oMath xmlns:m="http://schemas.openxmlformats.org/officeDocument/2006/math">
+                      <m:sSub>
+                        <m:sSubPr>
+                          <m:ctrlPr>
+                            <a:rPr lang="en-GB" sz="1200" b="0" i="1" smtClean="0">
+                              <a:latin typeface="Cambria Math" panose="02040503050406030204" pitchFamily="18" charset="0"/>
+                            </a:rPr>
+                          </m:ctrlPr>
+                        </m:sSubPr>
+                        <m:e>
+                          <m:r>
+                            <a:rPr lang="en-GB" sz="1200" b="0" i="1" smtClean="0">
+                              <a:latin typeface="Cambria Math" panose="02040503050406030204" pitchFamily="18" charset="0"/>
+                            </a:rPr>
+                            <m:t>1−</m:t>
+                          </m:r>
+                          <m:r>
+                            <a:rPr lang="en-GB" sz="1200" b="0" i="1" smtClean="0">
+                              <a:latin typeface="Cambria Math" panose="02040503050406030204" pitchFamily="18" charset="0"/>
+                            </a:rPr>
+                            <m:t>𝑃</m:t>
+                          </m:r>
+                        </m:e>
+                        <m:sub>
+                          <m:r>
+                            <a:rPr lang="en-GB" sz="1200" b="0" i="1" smtClean="0">
+                              <a:latin typeface="Cambria Math" panose="02040503050406030204" pitchFamily="18" charset="0"/>
+                            </a:rPr>
+                            <m:t>𝑠𝑎𝑚𝑝𝑙𝑒</m:t>
+                          </m:r>
+                          <m:r>
+                            <a:rPr lang="en-GB" sz="1200" b="0" i="1" smtClean="0">
+                              <a:latin typeface="Cambria Math" panose="02040503050406030204" pitchFamily="18" charset="0"/>
+                            </a:rPr>
+                            <m:t>, </m:t>
+                          </m:r>
+                          <m:r>
+                            <a:rPr lang="en-GB" sz="1200" b="0" i="1" smtClean="0">
+                              <a:latin typeface="Cambria Math" panose="02040503050406030204" pitchFamily="18" charset="0"/>
+                            </a:rPr>
+                            <m:t>𝑆𝑆𝑀</m:t>
+                          </m:r>
+                        </m:sub>
+                      </m:sSub>
+                    </m:oMath>
+                  </m:oMathPara>
+                </a14:m>
+                <a:endParaRPr lang="en-GB" sz="1200" dirty="0"/>
+              </a:p>
+            </p:txBody>
+          </p:sp>
+        </mc:Choice>
+        <mc:Fallback xmlns="">
+          <p:sp>
+            <p:nvSpPr>
+              <p:cNvPr id="30" name="TextBox 29">
+                <a:extLst>
+                  <a:ext uri="{FF2B5EF4-FFF2-40B4-BE49-F238E27FC236}">
+                    <a16:creationId xmlns:a16="http://schemas.microsoft.com/office/drawing/2014/main" id="{3C547BD1-0D33-75D0-8B89-8974FC10DBFA}"/>
+                  </a:ext>
+                </a:extLst>
+              </p:cNvPr>
+              <p:cNvSpPr txBox="1">
+                <a:spLocks noRot="1" noChangeAspect="1" noMove="1" noResize="1" noEditPoints="1" noAdjustHandles="1" noChangeArrowheads="1" noChangeShapeType="1" noTextEdit="1"/>
+              </p:cNvSpPr>
+              <p:nvPr/>
+            </p:nvSpPr>
+            <p:spPr>
+              <a:xfrm>
+                <a:off x="3439009" y="5568593"/>
+                <a:ext cx="1362075" cy="291298"/>
+              </a:xfrm>
+              <a:prstGeom prst="rect">
+                <a:avLst/>
+              </a:prstGeom>
+              <a:blipFill>
+                <a:blip r:embed="rId2"/>
+                <a:stretch>
+                  <a:fillRect/>
+                </a:stretch>
+              </a:blipFill>
+            </p:spPr>
+            <p:txBody>
+              <a:bodyPr/>
+              <a:lstStyle/>
+              <a:p>
+                <a:r>
+                  <a:rPr lang="en-GB">
+                    <a:noFill/>
+                  </a:rPr>
+                  <a:t> </a:t>
+                </a:r>
+              </a:p>
+            </p:txBody>
+          </p:sp>
+        </mc:Fallback>
+      </mc:AlternateContent>
+      <mc:AlternateContent xmlns:mc="http://schemas.openxmlformats.org/markup-compatibility/2006" xmlns:a14="http://schemas.microsoft.com/office/drawing/2010/main">
+        <mc:Choice Requires="a14">
+          <p:sp>
+            <p:nvSpPr>
+              <p:cNvPr id="34" name="TextBox 33">
+                <a:extLst>
+                  <a:ext uri="{FF2B5EF4-FFF2-40B4-BE49-F238E27FC236}">
+                    <a16:creationId xmlns:a16="http://schemas.microsoft.com/office/drawing/2014/main" id="{073D1C20-E3E2-8C3D-14EF-67EAD3B7B27C}"/>
+                  </a:ext>
+                </a:extLst>
+              </p:cNvPr>
+              <p:cNvSpPr txBox="1"/>
+              <p:nvPr/>
+            </p:nvSpPr>
+            <p:spPr>
+              <a:xfrm>
+                <a:off x="3831540" y="4830710"/>
+                <a:ext cx="665721" cy="291298"/>
+              </a:xfrm>
+              <a:prstGeom prst="rect">
+                <a:avLst/>
+              </a:prstGeom>
+              <a:noFill/>
+            </p:spPr>
+            <p:txBody>
+              <a:bodyPr wrap="square">
+                <a:spAutoFit/>
+              </a:bodyPr>
+              <a:lstStyle/>
+              <a:p>
+                <a:pPr/>
+                <a14:m>
+                  <m:oMathPara xmlns:m="http://schemas.openxmlformats.org/officeDocument/2006/math">
+                    <m:oMathParaPr>
+                      <m:jc m:val="centerGroup"/>
+                    </m:oMathParaPr>
+                    <m:oMath xmlns:m="http://schemas.openxmlformats.org/officeDocument/2006/math">
+                      <m:sSub>
+                        <m:sSubPr>
+                          <m:ctrlPr>
+                            <a:rPr lang="en-GB" sz="1200" i="1" smtClean="0">
+                              <a:latin typeface="Cambria Math" panose="02040503050406030204" pitchFamily="18" charset="0"/>
+                            </a:rPr>
+                          </m:ctrlPr>
+                        </m:sSubPr>
+                        <m:e>
+                          <m:r>
+                            <a:rPr lang="en-GB" sz="1200" i="1">
+                              <a:latin typeface="Cambria Math" panose="02040503050406030204" pitchFamily="18" charset="0"/>
+                            </a:rPr>
+                            <m:t>𝑃</m:t>
+                          </m:r>
+                        </m:e>
+                        <m:sub>
+                          <m:r>
+                            <a:rPr lang="en-GB" sz="1200" i="1">
+                              <a:latin typeface="Cambria Math" panose="02040503050406030204" pitchFamily="18" charset="0"/>
+                            </a:rPr>
+                            <m:t>𝑠</m:t>
+                          </m:r>
+                          <m:r>
+                            <a:rPr lang="en-GB" sz="1200" b="0" i="1" smtClean="0">
+                              <a:latin typeface="Cambria Math" panose="02040503050406030204" pitchFamily="18" charset="0"/>
+                            </a:rPr>
+                            <m:t>𝑎𝑚𝑝𝑙𝑒</m:t>
+                          </m:r>
+                          <m:r>
+                            <a:rPr lang="en-GB" sz="1200" b="0" i="1" smtClean="0">
+                              <a:latin typeface="Cambria Math" panose="02040503050406030204" pitchFamily="18" charset="0"/>
+                            </a:rPr>
+                            <m:t>,</m:t>
+                          </m:r>
+                          <m:r>
+                            <a:rPr lang="en-GB" sz="1200" b="0" i="1" smtClean="0">
+                              <a:latin typeface="Cambria Math" panose="02040503050406030204" pitchFamily="18" charset="0"/>
+                            </a:rPr>
+                            <m:t>𝑆𝑆𝑀</m:t>
+                          </m:r>
+                        </m:sub>
+                      </m:sSub>
+                    </m:oMath>
+                  </m:oMathPara>
+                </a14:m>
+                <a:endParaRPr lang="en-GB" sz="1200" dirty="0"/>
+              </a:p>
+            </p:txBody>
+          </p:sp>
+        </mc:Choice>
+        <mc:Fallback xmlns="">
+          <p:sp>
+            <p:nvSpPr>
+              <p:cNvPr id="34" name="TextBox 33">
+                <a:extLst>
+                  <a:ext uri="{FF2B5EF4-FFF2-40B4-BE49-F238E27FC236}">
+                    <a16:creationId xmlns:a16="http://schemas.microsoft.com/office/drawing/2014/main" id="{073D1C20-E3E2-8C3D-14EF-67EAD3B7B27C}"/>
+                  </a:ext>
+                </a:extLst>
+              </p:cNvPr>
+              <p:cNvSpPr txBox="1">
+                <a:spLocks noRot="1" noChangeAspect="1" noMove="1" noResize="1" noEditPoints="1" noAdjustHandles="1" noChangeArrowheads="1" noChangeShapeType="1" noTextEdit="1"/>
+              </p:cNvSpPr>
+              <p:nvPr/>
+            </p:nvSpPr>
+            <p:spPr>
+              <a:xfrm>
+                <a:off x="3831540" y="4830710"/>
+                <a:ext cx="665721" cy="291298"/>
+              </a:xfrm>
+              <a:prstGeom prst="rect">
+                <a:avLst/>
+              </a:prstGeom>
+              <a:blipFill>
+                <a:blip r:embed="rId3"/>
+                <a:stretch>
+                  <a:fillRect r="-28440"/>
+                </a:stretch>
+              </a:blipFill>
+            </p:spPr>
+            <p:txBody>
+              <a:bodyPr/>
+              <a:lstStyle/>
+              <a:p>
+                <a:r>
+                  <a:rPr lang="en-GB">
+                    <a:noFill/>
+                  </a:rPr>
+                  <a:t> </a:t>
+                </a:r>
+              </a:p>
+            </p:txBody>
+          </p:sp>
+        </mc:Fallback>
+      </mc:AlternateContent>
+      <p:sp>
+        <p:nvSpPr>
+          <p:cNvPr id="35" name="Rectangle 34">
+            <a:extLst>
+              <a:ext uri="{FF2B5EF4-FFF2-40B4-BE49-F238E27FC236}">
+                <a16:creationId xmlns:a16="http://schemas.microsoft.com/office/drawing/2014/main" id="{E932D627-D18B-C7E8-49EE-A0C45E5AF440}"/>
+              </a:ext>
+            </a:extLst>
+          </p:cNvPr>
+          <p:cNvSpPr/>
+          <p:nvPr/>
+        </p:nvSpPr>
+        <p:spPr>
+          <a:xfrm>
+            <a:off x="7536858" y="4630155"/>
+            <a:ext cx="1892063" cy="617966"/>
+          </a:xfrm>
+          <a:prstGeom prst="rect">
+            <a:avLst/>
+          </a:prstGeom>
+          <a:ln/>
+        </p:spPr>
+        <p:style>
+          <a:lnRef idx="2">
+            <a:schemeClr val="accent6"/>
+          </a:lnRef>
+          <a:fillRef idx="1">
+            <a:schemeClr val="lt1"/>
+          </a:fillRef>
+          <a:effectRef idx="0">
+            <a:schemeClr val="accent6"/>
+          </a:effectRef>
+          <a:fontRef idx="minor">
+            <a:schemeClr val="dk1"/>
+          </a:fontRef>
+        </p:style>
+        <p:txBody>
+          <a:bodyPr rtlCol="0" anchor="ctr"/>
+          <a:lstStyle/>
+          <a:p>
+            <a:pPr algn="ctr"/>
+            <a:r>
+              <a:rPr lang="en-US" sz="1400" dirty="0"/>
+              <a:t>Test positive</a:t>
+            </a:r>
+            <a:endParaRPr lang="en-GB" sz="1400" dirty="0"/>
+          </a:p>
+        </p:txBody>
+      </p:sp>
+      <p:sp>
+        <p:nvSpPr>
+          <p:cNvPr id="36" name="Rectangle 35">
+            <a:extLst>
+              <a:ext uri="{FF2B5EF4-FFF2-40B4-BE49-F238E27FC236}">
+                <a16:creationId xmlns:a16="http://schemas.microsoft.com/office/drawing/2014/main" id="{D5A26A6E-48CF-8C7F-A792-760B67FBF9F1}"/>
+              </a:ext>
+            </a:extLst>
+          </p:cNvPr>
+          <p:cNvSpPr/>
+          <p:nvPr/>
+        </p:nvSpPr>
+        <p:spPr>
+          <a:xfrm>
+            <a:off x="7536858" y="5318392"/>
+            <a:ext cx="1892063" cy="694344"/>
+          </a:xfrm>
+          <a:prstGeom prst="rect">
+            <a:avLst/>
+          </a:prstGeom>
+          <a:ln/>
+        </p:spPr>
+        <p:style>
+          <a:lnRef idx="2">
+            <a:schemeClr val="accent2"/>
+          </a:lnRef>
+          <a:fillRef idx="1">
+            <a:schemeClr val="lt1"/>
+          </a:fillRef>
+          <a:effectRef idx="0">
+            <a:schemeClr val="accent2"/>
+          </a:effectRef>
+          <a:fontRef idx="minor">
+            <a:schemeClr val="dk1"/>
+          </a:fontRef>
+        </p:style>
+        <p:txBody>
+          <a:bodyPr rtlCol="0" anchor="ctr"/>
+          <a:lstStyle/>
+          <a:p>
+            <a:pPr algn="ctr"/>
+            <a:r>
+              <a:rPr lang="en-US" sz="1400" dirty="0"/>
+              <a:t>Test negative</a:t>
+            </a:r>
+          </a:p>
+          <a:p>
+            <a:pPr algn="ctr"/>
+            <a:endParaRPr lang="en-US" sz="1400" dirty="0"/>
+          </a:p>
+          <a:p>
+            <a:pPr algn="ctr"/>
+            <a:r>
+              <a:rPr lang="en-US" sz="1400" dirty="0"/>
+              <a:t>Fail to collect sample</a:t>
+            </a:r>
+          </a:p>
+        </p:txBody>
+      </p:sp>
+      <p:sp>
+        <p:nvSpPr>
+          <p:cNvPr id="46" name="Rectangle 45">
+            <a:extLst>
+              <a:ext uri="{FF2B5EF4-FFF2-40B4-BE49-F238E27FC236}">
+                <a16:creationId xmlns:a16="http://schemas.microsoft.com/office/drawing/2014/main" id="{7C378566-E57D-5E8F-C6D6-B62EE4B0F803}"/>
+              </a:ext>
+            </a:extLst>
+          </p:cNvPr>
+          <p:cNvSpPr/>
+          <p:nvPr/>
+        </p:nvSpPr>
+        <p:spPr>
+          <a:xfrm>
+            <a:off x="2680596" y="3349804"/>
+            <a:ext cx="4583334" cy="617966"/>
+          </a:xfrm>
+          <a:prstGeom prst="rect">
+            <a:avLst/>
+          </a:prstGeom>
+          <a:ln>
+            <a:prstDash val="sysDot"/>
+          </a:ln>
+        </p:spPr>
+        <p:style>
+          <a:lnRef idx="2">
+            <a:schemeClr val="accent1"/>
+          </a:lnRef>
+          <a:fillRef idx="1">
+            <a:schemeClr val="lt1"/>
+          </a:fillRef>
+          <a:effectRef idx="0">
+            <a:schemeClr val="accent1"/>
+          </a:effectRef>
+          <a:fontRef idx="minor">
+            <a:schemeClr val="dk1"/>
+          </a:fontRef>
+        </p:style>
+        <p:txBody>
+          <a:bodyPr rtlCol="0" anchor="ctr"/>
+          <a:lstStyle/>
+          <a:p>
+            <a:pPr algn="ctr"/>
+            <a:endParaRPr lang="en-GB"/>
+          </a:p>
+        </p:txBody>
+      </p:sp>
+      <p:sp>
+        <p:nvSpPr>
+          <p:cNvPr id="47" name="Rectangle 46">
+            <a:extLst>
+              <a:ext uri="{FF2B5EF4-FFF2-40B4-BE49-F238E27FC236}">
+                <a16:creationId xmlns:a16="http://schemas.microsoft.com/office/drawing/2014/main" id="{F11230FE-A2EB-41B8-2D2D-711DD6B0C5DC}"/>
+              </a:ext>
+            </a:extLst>
+          </p:cNvPr>
+          <p:cNvSpPr/>
+          <p:nvPr/>
+        </p:nvSpPr>
+        <p:spPr>
+          <a:xfrm>
+            <a:off x="6005861" y="3478231"/>
+            <a:ext cx="901936" cy="361112"/>
+          </a:xfrm>
+          <a:prstGeom prst="rect">
+            <a:avLst/>
+          </a:prstGeom>
+        </p:spPr>
+        <p:style>
+          <a:lnRef idx="2">
+            <a:schemeClr val="accent1">
+              <a:shade val="15000"/>
+            </a:schemeClr>
+          </a:lnRef>
+          <a:fillRef idx="1">
+            <a:schemeClr val="accent1"/>
+          </a:fillRef>
+          <a:effectRef idx="0">
+            <a:schemeClr val="accent1"/>
+          </a:effectRef>
+          <a:fontRef idx="minor">
+            <a:schemeClr val="lt1"/>
+          </a:fontRef>
+        </p:style>
+        <p:txBody>
+          <a:bodyPr rtlCol="0" anchor="ctr"/>
+          <a:lstStyle>
+            <a:defPPr>
+              <a:defRPr lang="en-US"/>
+            </a:defPPr>
+            <a:lvl1pPr marL="0" algn="l" defTabSz="914400" rtl="0" eaLnBrk="1" latinLnBrk="0" hangingPunct="1">
+              <a:defRPr sz="1800" kern="1200">
+                <a:solidFill>
+                  <a:schemeClr val="lt1"/>
+                </a:solidFill>
+                <a:latin typeface="+mn-lt"/>
+                <a:ea typeface="+mn-ea"/>
+                <a:cs typeface="+mn-cs"/>
+              </a:defRPr>
+            </a:lvl1pPr>
+            <a:lvl2pPr marL="457200" algn="l" defTabSz="914400" rtl="0" eaLnBrk="1" latinLnBrk="0" hangingPunct="1">
+              <a:defRPr sz="1800" kern="1200">
+                <a:solidFill>
+                  <a:schemeClr val="lt1"/>
+                </a:solidFill>
+                <a:latin typeface="+mn-lt"/>
+                <a:ea typeface="+mn-ea"/>
+                <a:cs typeface="+mn-cs"/>
+              </a:defRPr>
+            </a:lvl2pPr>
+            <a:lvl3pPr marL="914400" algn="l" defTabSz="914400" rtl="0" eaLnBrk="1" latinLnBrk="0" hangingPunct="1">
+              <a:defRPr sz="1800" kern="1200">
+                <a:solidFill>
+                  <a:schemeClr val="lt1"/>
+                </a:solidFill>
+                <a:latin typeface="+mn-lt"/>
+                <a:ea typeface="+mn-ea"/>
+                <a:cs typeface="+mn-cs"/>
+              </a:defRPr>
+            </a:lvl3pPr>
+            <a:lvl4pPr marL="1371600" algn="l" defTabSz="914400" rtl="0" eaLnBrk="1" latinLnBrk="0" hangingPunct="1">
+              <a:defRPr sz="1800" kern="1200">
+                <a:solidFill>
+                  <a:schemeClr val="lt1"/>
+                </a:solidFill>
+                <a:latin typeface="+mn-lt"/>
+                <a:ea typeface="+mn-ea"/>
+                <a:cs typeface="+mn-cs"/>
+              </a:defRPr>
+            </a:lvl4pPr>
+            <a:lvl5pPr marL="1828800" algn="l" defTabSz="914400" rtl="0" eaLnBrk="1" latinLnBrk="0" hangingPunct="1">
+              <a:defRPr sz="1800" kern="1200">
+                <a:solidFill>
+                  <a:schemeClr val="lt1"/>
+                </a:solidFill>
+                <a:latin typeface="+mn-lt"/>
+                <a:ea typeface="+mn-ea"/>
+                <a:cs typeface="+mn-cs"/>
+              </a:defRPr>
+            </a:lvl5pPr>
+            <a:lvl6pPr marL="2286000" algn="l" defTabSz="914400" rtl="0" eaLnBrk="1" latinLnBrk="0" hangingPunct="1">
+              <a:defRPr sz="1800" kern="1200">
+                <a:solidFill>
+                  <a:schemeClr val="lt1"/>
+                </a:solidFill>
+                <a:latin typeface="+mn-lt"/>
+                <a:ea typeface="+mn-ea"/>
+                <a:cs typeface="+mn-cs"/>
+              </a:defRPr>
+            </a:lvl6pPr>
+            <a:lvl7pPr marL="2743200" algn="l" defTabSz="914400" rtl="0" eaLnBrk="1" latinLnBrk="0" hangingPunct="1">
+              <a:defRPr sz="1800" kern="1200">
+                <a:solidFill>
+                  <a:schemeClr val="lt1"/>
+                </a:solidFill>
+                <a:latin typeface="+mn-lt"/>
+                <a:ea typeface="+mn-ea"/>
+                <a:cs typeface="+mn-cs"/>
+              </a:defRPr>
+            </a:lvl7pPr>
+            <a:lvl8pPr marL="3200400" algn="l" defTabSz="914400" rtl="0" eaLnBrk="1" latinLnBrk="0" hangingPunct="1">
+              <a:defRPr sz="1800" kern="1200">
+                <a:solidFill>
+                  <a:schemeClr val="lt1"/>
+                </a:solidFill>
+                <a:latin typeface="+mn-lt"/>
+                <a:ea typeface="+mn-ea"/>
+                <a:cs typeface="+mn-cs"/>
+              </a:defRPr>
+            </a:lvl8pPr>
+            <a:lvl9pPr marL="3657600" algn="l" defTabSz="914400" rtl="0" eaLnBrk="1" latinLnBrk="0" hangingPunct="1">
+              <a:defRPr sz="1800" kern="1200">
+                <a:solidFill>
+                  <a:schemeClr val="lt1"/>
+                </a:solidFill>
+                <a:latin typeface="+mn-lt"/>
+                <a:ea typeface="+mn-ea"/>
+                <a:cs typeface="+mn-cs"/>
+              </a:defRPr>
+            </a:lvl9pPr>
+          </a:lstStyle>
+          <a:p>
+            <a:pPr algn="ctr"/>
+            <a:r>
+              <a:rPr lang="en-US" sz="1200" dirty="0"/>
+              <a:t>CBNAAT</a:t>
+            </a:r>
+          </a:p>
+        </p:txBody>
+      </p:sp>
+      <p:sp>
+        <p:nvSpPr>
+          <p:cNvPr id="49" name="Rectangle 48">
+            <a:extLst>
+              <a:ext uri="{FF2B5EF4-FFF2-40B4-BE49-F238E27FC236}">
+                <a16:creationId xmlns:a16="http://schemas.microsoft.com/office/drawing/2014/main" id="{4E6ADE01-1BBD-6BCD-870F-D931F278E495}"/>
+              </a:ext>
+            </a:extLst>
+          </p:cNvPr>
+          <p:cNvSpPr/>
+          <p:nvPr/>
+        </p:nvSpPr>
+        <p:spPr>
+          <a:xfrm>
+            <a:off x="2993886" y="3478231"/>
+            <a:ext cx="901936" cy="361112"/>
+          </a:xfrm>
+          <a:prstGeom prst="rect">
+            <a:avLst/>
+          </a:prstGeom>
+        </p:spPr>
+        <p:style>
+          <a:lnRef idx="2">
+            <a:schemeClr val="accent1">
+              <a:shade val="15000"/>
+            </a:schemeClr>
+          </a:lnRef>
+          <a:fillRef idx="1">
+            <a:schemeClr val="accent1"/>
+          </a:fillRef>
+          <a:effectRef idx="0">
+            <a:schemeClr val="accent1"/>
+          </a:effectRef>
+          <a:fontRef idx="minor">
+            <a:schemeClr val="lt1"/>
+          </a:fontRef>
+        </p:style>
+        <p:txBody>
+          <a:bodyPr rtlCol="0" anchor="ctr"/>
+          <a:lstStyle>
+            <a:defPPr>
+              <a:defRPr lang="en-US"/>
+            </a:defPPr>
+            <a:lvl1pPr marL="0" algn="l" defTabSz="914400" rtl="0" eaLnBrk="1" latinLnBrk="0" hangingPunct="1">
+              <a:defRPr sz="1800" kern="1200">
+                <a:solidFill>
+                  <a:schemeClr val="lt1"/>
+                </a:solidFill>
+                <a:latin typeface="+mn-lt"/>
+                <a:ea typeface="+mn-ea"/>
+                <a:cs typeface="+mn-cs"/>
+              </a:defRPr>
+            </a:lvl1pPr>
+            <a:lvl2pPr marL="457200" algn="l" defTabSz="914400" rtl="0" eaLnBrk="1" latinLnBrk="0" hangingPunct="1">
+              <a:defRPr sz="1800" kern="1200">
+                <a:solidFill>
+                  <a:schemeClr val="lt1"/>
+                </a:solidFill>
+                <a:latin typeface="+mn-lt"/>
+                <a:ea typeface="+mn-ea"/>
+                <a:cs typeface="+mn-cs"/>
+              </a:defRPr>
+            </a:lvl2pPr>
+            <a:lvl3pPr marL="914400" algn="l" defTabSz="914400" rtl="0" eaLnBrk="1" latinLnBrk="0" hangingPunct="1">
+              <a:defRPr sz="1800" kern="1200">
+                <a:solidFill>
+                  <a:schemeClr val="lt1"/>
+                </a:solidFill>
+                <a:latin typeface="+mn-lt"/>
+                <a:ea typeface="+mn-ea"/>
+                <a:cs typeface="+mn-cs"/>
+              </a:defRPr>
+            </a:lvl3pPr>
+            <a:lvl4pPr marL="1371600" algn="l" defTabSz="914400" rtl="0" eaLnBrk="1" latinLnBrk="0" hangingPunct="1">
+              <a:defRPr sz="1800" kern="1200">
+                <a:solidFill>
+                  <a:schemeClr val="lt1"/>
+                </a:solidFill>
+                <a:latin typeface="+mn-lt"/>
+                <a:ea typeface="+mn-ea"/>
+                <a:cs typeface="+mn-cs"/>
+              </a:defRPr>
+            </a:lvl4pPr>
+            <a:lvl5pPr marL="1828800" algn="l" defTabSz="914400" rtl="0" eaLnBrk="1" latinLnBrk="0" hangingPunct="1">
+              <a:defRPr sz="1800" kern="1200">
+                <a:solidFill>
+                  <a:schemeClr val="lt1"/>
+                </a:solidFill>
+                <a:latin typeface="+mn-lt"/>
+                <a:ea typeface="+mn-ea"/>
+                <a:cs typeface="+mn-cs"/>
+              </a:defRPr>
+            </a:lvl5pPr>
+            <a:lvl6pPr marL="2286000" algn="l" defTabSz="914400" rtl="0" eaLnBrk="1" latinLnBrk="0" hangingPunct="1">
+              <a:defRPr sz="1800" kern="1200">
+                <a:solidFill>
+                  <a:schemeClr val="lt1"/>
+                </a:solidFill>
+                <a:latin typeface="+mn-lt"/>
+                <a:ea typeface="+mn-ea"/>
+                <a:cs typeface="+mn-cs"/>
+              </a:defRPr>
+            </a:lvl6pPr>
+            <a:lvl7pPr marL="2743200" algn="l" defTabSz="914400" rtl="0" eaLnBrk="1" latinLnBrk="0" hangingPunct="1">
+              <a:defRPr sz="1800" kern="1200">
+                <a:solidFill>
+                  <a:schemeClr val="lt1"/>
+                </a:solidFill>
+                <a:latin typeface="+mn-lt"/>
+                <a:ea typeface="+mn-ea"/>
+                <a:cs typeface="+mn-cs"/>
+              </a:defRPr>
+            </a:lvl7pPr>
+            <a:lvl8pPr marL="3200400" algn="l" defTabSz="914400" rtl="0" eaLnBrk="1" latinLnBrk="0" hangingPunct="1">
+              <a:defRPr sz="1800" kern="1200">
+                <a:solidFill>
+                  <a:schemeClr val="lt1"/>
+                </a:solidFill>
+                <a:latin typeface="+mn-lt"/>
+                <a:ea typeface="+mn-ea"/>
+                <a:cs typeface="+mn-cs"/>
+              </a:defRPr>
+            </a:lvl8pPr>
+            <a:lvl9pPr marL="3657600" algn="l" defTabSz="914400" rtl="0" eaLnBrk="1" latinLnBrk="0" hangingPunct="1">
+              <a:defRPr sz="1800" kern="1200">
+                <a:solidFill>
+                  <a:schemeClr val="lt1"/>
+                </a:solidFill>
+                <a:latin typeface="+mn-lt"/>
+                <a:ea typeface="+mn-ea"/>
+                <a:cs typeface="+mn-cs"/>
+              </a:defRPr>
+            </a:lvl9pPr>
+          </a:lstStyle>
+          <a:p>
+            <a:pPr algn="ctr"/>
+            <a:r>
+              <a:rPr lang="en-US" sz="1200" dirty="0"/>
+              <a:t>Sample</a:t>
+            </a:r>
+          </a:p>
+        </p:txBody>
+      </p:sp>
+      <p:cxnSp>
+        <p:nvCxnSpPr>
+          <p:cNvPr id="53" name="Straight Arrow Connector 52">
+            <a:extLst>
+              <a:ext uri="{FF2B5EF4-FFF2-40B4-BE49-F238E27FC236}">
+                <a16:creationId xmlns:a16="http://schemas.microsoft.com/office/drawing/2014/main" id="{E5A2F908-7466-3809-B71C-62515F13FB1E}"/>
+              </a:ext>
+            </a:extLst>
+          </p:cNvPr>
+          <p:cNvCxnSpPr>
+            <a:cxnSpLocks/>
+            <a:stCxn id="49" idx="3"/>
+            <a:endCxn id="47" idx="1"/>
+          </p:cNvCxnSpPr>
+          <p:nvPr/>
+        </p:nvCxnSpPr>
+        <p:spPr>
+          <a:xfrm>
+            <a:off x="3895822" y="3658787"/>
+            <a:ext cx="2110039" cy="0"/>
+          </a:xfrm>
+          <a:prstGeom prst="straightConnector1">
+            <a:avLst/>
+          </a:prstGeom>
+          <a:ln>
+            <a:tailEnd type="triangle"/>
+          </a:ln>
+        </p:spPr>
+        <p:style>
+          <a:lnRef idx="1">
+            <a:schemeClr val="accent6"/>
+          </a:lnRef>
+          <a:fillRef idx="0">
+            <a:schemeClr val="accent6"/>
+          </a:fillRef>
+          <a:effectRef idx="0">
+            <a:schemeClr val="accent6"/>
+          </a:effectRef>
+          <a:fontRef idx="minor">
+            <a:schemeClr val="tx1"/>
+          </a:fontRef>
+        </p:style>
+      </p:cxnSp>
+      <p:cxnSp>
+        <p:nvCxnSpPr>
+          <p:cNvPr id="54" name="Connector: Elbow 53">
+            <a:extLst>
+              <a:ext uri="{FF2B5EF4-FFF2-40B4-BE49-F238E27FC236}">
+                <a16:creationId xmlns:a16="http://schemas.microsoft.com/office/drawing/2014/main" id="{9A1DFE98-33E3-8CED-6E66-9B5413A3E3F4}"/>
+              </a:ext>
+            </a:extLst>
+          </p:cNvPr>
+          <p:cNvCxnSpPr>
+            <a:cxnSpLocks/>
+            <a:stCxn id="49" idx="2"/>
+          </p:cNvCxnSpPr>
+          <p:nvPr/>
+        </p:nvCxnSpPr>
+        <p:spPr>
+          <a:xfrm rot="16200000" flipH="1">
+            <a:off x="5194607" y="2089590"/>
+            <a:ext cx="519595" cy="4019100"/>
+          </a:xfrm>
+          <a:prstGeom prst="bentConnector2">
+            <a:avLst/>
+          </a:prstGeom>
+          <a:ln>
+            <a:tailEnd type="triangle"/>
+          </a:ln>
+        </p:spPr>
+        <p:style>
+          <a:lnRef idx="1">
+            <a:schemeClr val="accent2"/>
+          </a:lnRef>
+          <a:fillRef idx="0">
+            <a:schemeClr val="accent2"/>
+          </a:fillRef>
+          <a:effectRef idx="0">
+            <a:schemeClr val="accent2"/>
+          </a:effectRef>
+          <a:fontRef idx="minor">
+            <a:schemeClr val="tx1"/>
+          </a:fontRef>
+        </p:style>
+      </p:cxnSp>
+      <p:cxnSp>
+        <p:nvCxnSpPr>
+          <p:cNvPr id="55" name="Straight Arrow Connector 54">
+            <a:extLst>
+              <a:ext uri="{FF2B5EF4-FFF2-40B4-BE49-F238E27FC236}">
+                <a16:creationId xmlns:a16="http://schemas.microsoft.com/office/drawing/2014/main" id="{0CC28CF4-4AF7-4EB0-EE10-6CFC0A76B40B}"/>
+              </a:ext>
+            </a:extLst>
+          </p:cNvPr>
+          <p:cNvCxnSpPr>
+            <a:cxnSpLocks/>
+            <a:stCxn id="47" idx="3"/>
+          </p:cNvCxnSpPr>
+          <p:nvPr/>
+        </p:nvCxnSpPr>
+        <p:spPr>
+          <a:xfrm>
+            <a:off x="6907797" y="3658787"/>
+            <a:ext cx="556157" cy="0"/>
+          </a:xfrm>
+          <a:prstGeom prst="straightConnector1">
+            <a:avLst/>
+          </a:prstGeom>
+          <a:ln>
+            <a:tailEnd type="triangle"/>
+          </a:ln>
+        </p:spPr>
+        <p:style>
+          <a:lnRef idx="1">
+            <a:schemeClr val="accent6"/>
+          </a:lnRef>
+          <a:fillRef idx="0">
+            <a:schemeClr val="accent6"/>
+          </a:fillRef>
+          <a:effectRef idx="0">
+            <a:schemeClr val="accent6"/>
+          </a:effectRef>
+          <a:fontRef idx="minor">
+            <a:schemeClr val="tx1"/>
+          </a:fontRef>
+        </p:style>
+      </p:cxnSp>
+      <p:cxnSp>
+        <p:nvCxnSpPr>
+          <p:cNvPr id="56" name="Connector: Elbow 55">
+            <a:extLst>
+              <a:ext uri="{FF2B5EF4-FFF2-40B4-BE49-F238E27FC236}">
+                <a16:creationId xmlns:a16="http://schemas.microsoft.com/office/drawing/2014/main" id="{D73085EC-C83E-B409-D1DF-C4321E7F4931}"/>
+              </a:ext>
+            </a:extLst>
+          </p:cNvPr>
+          <p:cNvCxnSpPr>
+            <a:cxnSpLocks/>
+            <a:stCxn id="47" idx="2"/>
+          </p:cNvCxnSpPr>
+          <p:nvPr/>
+        </p:nvCxnSpPr>
+        <p:spPr>
+          <a:xfrm rot="16200000" flipH="1">
+            <a:off x="6870114" y="3426057"/>
             <a:ext cx="180556" cy="1007127"/>
           </a:xfrm>
           <a:prstGeom prst="bentConnector2">
@@ -41503,10 +42405,10 @@
         <mc:Choice xmlns:a14="http://schemas.microsoft.com/office/drawing/2010/main" Requires="a14">
           <p:sp>
             <p:nvSpPr>
-              <p:cNvPr id="30" name="TextBox 29">
+              <p:cNvPr id="57" name="TextBox 56">
                 <a:extLst>
                   <a:ext uri="{FF2B5EF4-FFF2-40B4-BE49-F238E27FC236}">
-                    <a16:creationId xmlns:a16="http://schemas.microsoft.com/office/drawing/2014/main" id="{3C547BD1-0D33-75D0-8B89-8974FC10DBFA}"/>
+                    <a16:creationId xmlns:a16="http://schemas.microsoft.com/office/drawing/2014/main" id="{387FF9CF-809C-F257-A9D6-F38CCB310669}"/>
                   </a:ext>
                 </a:extLst>
               </p:cNvPr>
@@ -41515,7 +42417,7 @@
             </p:nvSpPr>
             <p:spPr>
               <a:xfrm>
-                <a:off x="3214783" y="5575247"/>
+                <a:off x="3444853" y="4089543"/>
                 <a:ext cx="1362075" cy="291298"/>
               </a:xfrm>
               <a:prstGeom prst="rect">
@@ -41565,851 +42467,17 @@
                             </a:rPr>
                             <m:t>𝑠𝑝𝑢𝑡𝑢𝑚</m:t>
                           </m:r>
-                        </m:sub>
-                      </m:sSub>
-                    </m:oMath>
-                  </m:oMathPara>
-                </a14:m>
-                <a:endParaRPr lang="en-GB" sz="1200" dirty="0"/>
-              </a:p>
-            </p:txBody>
-          </p:sp>
-        </mc:Choice>
-        <mc:Fallback>
-          <p:sp>
-            <p:nvSpPr>
-              <p:cNvPr id="30" name="TextBox 29">
-                <a:extLst>
-                  <a:ext uri="{FF2B5EF4-FFF2-40B4-BE49-F238E27FC236}">
-                    <a16:creationId xmlns:a16="http://schemas.microsoft.com/office/drawing/2014/main" id="{3C547BD1-0D33-75D0-8B89-8974FC10DBFA}"/>
-                  </a:ext>
-                </a:extLst>
-              </p:cNvPr>
-              <p:cNvSpPr txBox="1">
-                <a:spLocks noRot="1" noChangeAspect="1" noMove="1" noResize="1" noEditPoints="1" noAdjustHandles="1" noChangeArrowheads="1" noChangeShapeType="1" noTextEdit="1"/>
-              </p:cNvSpPr>
-              <p:nvPr/>
-            </p:nvSpPr>
-            <p:spPr>
-              <a:xfrm>
-                <a:off x="3214783" y="5575247"/>
-                <a:ext cx="1362075" cy="291298"/>
-              </a:xfrm>
-              <a:prstGeom prst="rect">
-                <a:avLst/>
-              </a:prstGeom>
-              <a:blipFill>
-                <a:blip r:embed="rId2"/>
-                <a:stretch>
-                  <a:fillRect/>
-                </a:stretch>
-              </a:blipFill>
-            </p:spPr>
-            <p:txBody>
-              <a:bodyPr/>
-              <a:lstStyle/>
-              <a:p>
-                <a:r>
-                  <a:rPr lang="en-GB">
-                    <a:noFill/>
-                  </a:rPr>
-                  <a:t> </a:t>
-                </a:r>
-              </a:p>
-            </p:txBody>
-          </p:sp>
-        </mc:Fallback>
-      </mc:AlternateContent>
-      <mc:AlternateContent xmlns:mc="http://schemas.openxmlformats.org/markup-compatibility/2006">
-        <mc:Choice xmlns:a14="http://schemas.microsoft.com/office/drawing/2010/main" Requires="a14">
-          <p:sp>
-            <p:nvSpPr>
-              <p:cNvPr id="34" name="TextBox 33">
-                <a:extLst>
-                  <a:ext uri="{FF2B5EF4-FFF2-40B4-BE49-F238E27FC236}">
-                    <a16:creationId xmlns:a16="http://schemas.microsoft.com/office/drawing/2014/main" id="{073D1C20-E3E2-8C3D-14EF-67EAD3B7B27C}"/>
-                  </a:ext>
-                </a:extLst>
-              </p:cNvPr>
-              <p:cNvSpPr txBox="1"/>
-              <p:nvPr/>
-            </p:nvSpPr>
-            <p:spPr>
-              <a:xfrm>
-                <a:off x="3831540" y="4830710"/>
-                <a:ext cx="665721" cy="291298"/>
-              </a:xfrm>
-              <a:prstGeom prst="rect">
-                <a:avLst/>
-              </a:prstGeom>
-              <a:noFill/>
-            </p:spPr>
-            <p:txBody>
-              <a:bodyPr wrap="square">
-                <a:spAutoFit/>
-              </a:bodyPr>
-              <a:lstStyle/>
-              <a:p>
-                <a:pPr/>
-                <a14:m>
-                  <m:oMathPara xmlns:m="http://schemas.openxmlformats.org/officeDocument/2006/math">
-                    <m:oMathParaPr>
-                      <m:jc m:val="centerGroup"/>
-                    </m:oMathParaPr>
-                    <m:oMath xmlns:m="http://schemas.openxmlformats.org/officeDocument/2006/math">
-                      <m:sSub>
-                        <m:sSubPr>
-                          <m:ctrlPr>
-                            <a:rPr lang="en-GB" sz="1200" i="1">
-                              <a:latin typeface="Cambria Math" panose="02040503050406030204" pitchFamily="18" charset="0"/>
-                            </a:rPr>
-                          </m:ctrlPr>
-                        </m:sSubPr>
-                        <m:e>
-                          <m:r>
-                            <a:rPr lang="en-GB" sz="1200" i="1">
-                              <a:latin typeface="Cambria Math" panose="02040503050406030204" pitchFamily="18" charset="0"/>
-                            </a:rPr>
-                            <m:t>𝑃</m:t>
-                          </m:r>
-                        </m:e>
-                        <m:sub>
-                          <m:r>
-                            <a:rPr lang="en-GB" sz="1200" i="1">
-                              <a:latin typeface="Cambria Math" panose="02040503050406030204" pitchFamily="18" charset="0"/>
-                            </a:rPr>
-                            <m:t>𝑠𝑝𝑢𝑡𝑢𝑚</m:t>
-                          </m:r>
-                        </m:sub>
-                      </m:sSub>
-                    </m:oMath>
-                  </m:oMathPara>
-                </a14:m>
-                <a:endParaRPr lang="en-GB" sz="1200" dirty="0"/>
-              </a:p>
-            </p:txBody>
-          </p:sp>
-        </mc:Choice>
-        <mc:Fallback>
-          <p:sp>
-            <p:nvSpPr>
-              <p:cNvPr id="34" name="TextBox 33">
-                <a:extLst>
-                  <a:ext uri="{FF2B5EF4-FFF2-40B4-BE49-F238E27FC236}">
-                    <a16:creationId xmlns:a16="http://schemas.microsoft.com/office/drawing/2014/main" id="{073D1C20-E3E2-8C3D-14EF-67EAD3B7B27C}"/>
-                  </a:ext>
-                </a:extLst>
-              </p:cNvPr>
-              <p:cNvSpPr txBox="1">
-                <a:spLocks noRot="1" noChangeAspect="1" noMove="1" noResize="1" noEditPoints="1" noAdjustHandles="1" noChangeArrowheads="1" noChangeShapeType="1" noTextEdit="1"/>
-              </p:cNvSpPr>
-              <p:nvPr/>
-            </p:nvSpPr>
-            <p:spPr>
-              <a:xfrm>
-                <a:off x="3831540" y="4830710"/>
-                <a:ext cx="665721" cy="291298"/>
-              </a:xfrm>
-              <a:prstGeom prst="rect">
-                <a:avLst/>
-              </a:prstGeom>
-              <a:blipFill>
-                <a:blip r:embed="rId3"/>
-                <a:stretch>
-                  <a:fillRect/>
-                </a:stretch>
-              </a:blipFill>
-            </p:spPr>
-            <p:txBody>
-              <a:bodyPr/>
-              <a:lstStyle/>
-              <a:p>
-                <a:r>
-                  <a:rPr lang="en-GB">
-                    <a:noFill/>
-                  </a:rPr>
-                  <a:t> </a:t>
-                </a:r>
-              </a:p>
-            </p:txBody>
-          </p:sp>
-        </mc:Fallback>
-      </mc:AlternateContent>
-      <p:sp>
-        <p:nvSpPr>
-          <p:cNvPr id="35" name="Rectangle 34">
-            <a:extLst>
-              <a:ext uri="{FF2B5EF4-FFF2-40B4-BE49-F238E27FC236}">
-                <a16:creationId xmlns:a16="http://schemas.microsoft.com/office/drawing/2014/main" id="{E932D627-D18B-C7E8-49EE-A0C45E5AF440}"/>
-              </a:ext>
-            </a:extLst>
-          </p:cNvPr>
-          <p:cNvSpPr/>
-          <p:nvPr/>
-        </p:nvSpPr>
-        <p:spPr>
-          <a:xfrm>
-            <a:off x="7536858" y="4630155"/>
-            <a:ext cx="1892063" cy="617966"/>
-          </a:xfrm>
-          <a:prstGeom prst="rect">
-            <a:avLst/>
-          </a:prstGeom>
-          <a:ln/>
-        </p:spPr>
-        <p:style>
-          <a:lnRef idx="2">
-            <a:schemeClr val="accent6"/>
-          </a:lnRef>
-          <a:fillRef idx="1">
-            <a:schemeClr val="lt1"/>
-          </a:fillRef>
-          <a:effectRef idx="0">
-            <a:schemeClr val="accent6"/>
-          </a:effectRef>
-          <a:fontRef idx="minor">
-            <a:schemeClr val="dk1"/>
-          </a:fontRef>
-        </p:style>
-        <p:txBody>
-          <a:bodyPr rtlCol="0" anchor="ctr"/>
-          <a:lstStyle/>
-          <a:p>
-            <a:pPr algn="ctr"/>
-            <a:r>
-              <a:rPr lang="en-US" sz="1400" dirty="0"/>
-              <a:t>Test positive</a:t>
-            </a:r>
-            <a:endParaRPr lang="en-GB" sz="1400" dirty="0"/>
-          </a:p>
-        </p:txBody>
-      </p:sp>
-      <p:sp>
-        <p:nvSpPr>
-          <p:cNvPr id="36" name="Rectangle 35">
-            <a:extLst>
-              <a:ext uri="{FF2B5EF4-FFF2-40B4-BE49-F238E27FC236}">
-                <a16:creationId xmlns:a16="http://schemas.microsoft.com/office/drawing/2014/main" id="{D5A26A6E-48CF-8C7F-A792-760B67FBF9F1}"/>
-              </a:ext>
-            </a:extLst>
-          </p:cNvPr>
-          <p:cNvSpPr/>
-          <p:nvPr/>
-        </p:nvSpPr>
-        <p:spPr>
-          <a:xfrm>
-            <a:off x="7536858" y="5318392"/>
-            <a:ext cx="1892063" cy="694344"/>
-          </a:xfrm>
-          <a:prstGeom prst="rect">
-            <a:avLst/>
-          </a:prstGeom>
-          <a:ln/>
-        </p:spPr>
-        <p:style>
-          <a:lnRef idx="2">
-            <a:schemeClr val="accent2"/>
-          </a:lnRef>
-          <a:fillRef idx="1">
-            <a:schemeClr val="lt1"/>
-          </a:fillRef>
-          <a:effectRef idx="0">
-            <a:schemeClr val="accent2"/>
-          </a:effectRef>
-          <a:fontRef idx="minor">
-            <a:schemeClr val="dk1"/>
-          </a:fontRef>
-        </p:style>
-        <p:txBody>
-          <a:bodyPr rtlCol="0" anchor="ctr"/>
-          <a:lstStyle/>
-          <a:p>
-            <a:pPr algn="ctr"/>
-            <a:r>
-              <a:rPr lang="en-US" sz="1400" dirty="0"/>
-              <a:t>Test negative</a:t>
-            </a:r>
-          </a:p>
-          <a:p>
-            <a:pPr algn="ctr"/>
-            <a:endParaRPr lang="en-US" sz="1400" dirty="0"/>
-          </a:p>
-          <a:p>
-            <a:pPr algn="ctr"/>
-            <a:r>
-              <a:rPr lang="en-US" sz="1400" dirty="0"/>
-              <a:t>Fail to collect sample</a:t>
-            </a:r>
-          </a:p>
-        </p:txBody>
-      </p:sp>
-      <p:sp>
-        <p:nvSpPr>
-          <p:cNvPr id="46" name="Rectangle 45">
-            <a:extLst>
-              <a:ext uri="{FF2B5EF4-FFF2-40B4-BE49-F238E27FC236}">
-                <a16:creationId xmlns:a16="http://schemas.microsoft.com/office/drawing/2014/main" id="{7C378566-E57D-5E8F-C6D6-B62EE4B0F803}"/>
-              </a:ext>
-            </a:extLst>
-          </p:cNvPr>
-          <p:cNvSpPr/>
-          <p:nvPr/>
-        </p:nvSpPr>
-        <p:spPr>
-          <a:xfrm>
-            <a:off x="2680596" y="3349804"/>
-            <a:ext cx="4583334" cy="617966"/>
-          </a:xfrm>
-          <a:prstGeom prst="rect">
-            <a:avLst/>
-          </a:prstGeom>
-          <a:ln>
-            <a:prstDash val="sysDot"/>
-          </a:ln>
-        </p:spPr>
-        <p:style>
-          <a:lnRef idx="2">
-            <a:schemeClr val="accent1"/>
-          </a:lnRef>
-          <a:fillRef idx="1">
-            <a:schemeClr val="lt1"/>
-          </a:fillRef>
-          <a:effectRef idx="0">
-            <a:schemeClr val="accent1"/>
-          </a:effectRef>
-          <a:fontRef idx="minor">
-            <a:schemeClr val="dk1"/>
-          </a:fontRef>
-        </p:style>
-        <p:txBody>
-          <a:bodyPr rtlCol="0" anchor="ctr"/>
-          <a:lstStyle/>
-          <a:p>
-            <a:pPr algn="ctr"/>
-            <a:endParaRPr lang="en-GB"/>
-          </a:p>
-        </p:txBody>
-      </p:sp>
-      <p:sp>
-        <p:nvSpPr>
-          <p:cNvPr id="47" name="Rectangle 46">
-            <a:extLst>
-              <a:ext uri="{FF2B5EF4-FFF2-40B4-BE49-F238E27FC236}">
-                <a16:creationId xmlns:a16="http://schemas.microsoft.com/office/drawing/2014/main" id="{F11230FE-A2EB-41B8-2D2D-711DD6B0C5DC}"/>
-              </a:ext>
-            </a:extLst>
-          </p:cNvPr>
-          <p:cNvSpPr/>
-          <p:nvPr/>
-        </p:nvSpPr>
-        <p:spPr>
-          <a:xfrm>
-            <a:off x="6005861" y="3478231"/>
-            <a:ext cx="901936" cy="361112"/>
-          </a:xfrm>
-          <a:prstGeom prst="rect">
-            <a:avLst/>
-          </a:prstGeom>
-        </p:spPr>
-        <p:style>
-          <a:lnRef idx="2">
-            <a:schemeClr val="accent1">
-              <a:shade val="15000"/>
-            </a:schemeClr>
-          </a:lnRef>
-          <a:fillRef idx="1">
-            <a:schemeClr val="accent1"/>
-          </a:fillRef>
-          <a:effectRef idx="0">
-            <a:schemeClr val="accent1"/>
-          </a:effectRef>
-          <a:fontRef idx="minor">
-            <a:schemeClr val="lt1"/>
-          </a:fontRef>
-        </p:style>
-        <p:txBody>
-          <a:bodyPr rtlCol="0" anchor="ctr"/>
-          <a:lstStyle>
-            <a:defPPr>
-              <a:defRPr lang="en-US"/>
-            </a:defPPr>
-            <a:lvl1pPr marL="0" algn="l" defTabSz="914400" rtl="0" eaLnBrk="1" latinLnBrk="0" hangingPunct="1">
-              <a:defRPr sz="1800" kern="1200">
-                <a:solidFill>
-                  <a:schemeClr val="lt1"/>
-                </a:solidFill>
-                <a:latin typeface="+mn-lt"/>
-                <a:ea typeface="+mn-ea"/>
-                <a:cs typeface="+mn-cs"/>
-              </a:defRPr>
-            </a:lvl1pPr>
-            <a:lvl2pPr marL="457200" algn="l" defTabSz="914400" rtl="0" eaLnBrk="1" latinLnBrk="0" hangingPunct="1">
-              <a:defRPr sz="1800" kern="1200">
-                <a:solidFill>
-                  <a:schemeClr val="lt1"/>
-                </a:solidFill>
-                <a:latin typeface="+mn-lt"/>
-                <a:ea typeface="+mn-ea"/>
-                <a:cs typeface="+mn-cs"/>
-              </a:defRPr>
-            </a:lvl2pPr>
-            <a:lvl3pPr marL="914400" algn="l" defTabSz="914400" rtl="0" eaLnBrk="1" latinLnBrk="0" hangingPunct="1">
-              <a:defRPr sz="1800" kern="1200">
-                <a:solidFill>
-                  <a:schemeClr val="lt1"/>
-                </a:solidFill>
-                <a:latin typeface="+mn-lt"/>
-                <a:ea typeface="+mn-ea"/>
-                <a:cs typeface="+mn-cs"/>
-              </a:defRPr>
-            </a:lvl3pPr>
-            <a:lvl4pPr marL="1371600" algn="l" defTabSz="914400" rtl="0" eaLnBrk="1" latinLnBrk="0" hangingPunct="1">
-              <a:defRPr sz="1800" kern="1200">
-                <a:solidFill>
-                  <a:schemeClr val="lt1"/>
-                </a:solidFill>
-                <a:latin typeface="+mn-lt"/>
-                <a:ea typeface="+mn-ea"/>
-                <a:cs typeface="+mn-cs"/>
-              </a:defRPr>
-            </a:lvl4pPr>
-            <a:lvl5pPr marL="1828800" algn="l" defTabSz="914400" rtl="0" eaLnBrk="1" latinLnBrk="0" hangingPunct="1">
-              <a:defRPr sz="1800" kern="1200">
-                <a:solidFill>
-                  <a:schemeClr val="lt1"/>
-                </a:solidFill>
-                <a:latin typeface="+mn-lt"/>
-                <a:ea typeface="+mn-ea"/>
-                <a:cs typeface="+mn-cs"/>
-              </a:defRPr>
-            </a:lvl5pPr>
-            <a:lvl6pPr marL="2286000" algn="l" defTabSz="914400" rtl="0" eaLnBrk="1" latinLnBrk="0" hangingPunct="1">
-              <a:defRPr sz="1800" kern="1200">
-                <a:solidFill>
-                  <a:schemeClr val="lt1"/>
-                </a:solidFill>
-                <a:latin typeface="+mn-lt"/>
-                <a:ea typeface="+mn-ea"/>
-                <a:cs typeface="+mn-cs"/>
-              </a:defRPr>
-            </a:lvl6pPr>
-            <a:lvl7pPr marL="2743200" algn="l" defTabSz="914400" rtl="0" eaLnBrk="1" latinLnBrk="0" hangingPunct="1">
-              <a:defRPr sz="1800" kern="1200">
-                <a:solidFill>
-                  <a:schemeClr val="lt1"/>
-                </a:solidFill>
-                <a:latin typeface="+mn-lt"/>
-                <a:ea typeface="+mn-ea"/>
-                <a:cs typeface="+mn-cs"/>
-              </a:defRPr>
-            </a:lvl7pPr>
-            <a:lvl8pPr marL="3200400" algn="l" defTabSz="914400" rtl="0" eaLnBrk="1" latinLnBrk="0" hangingPunct="1">
-              <a:defRPr sz="1800" kern="1200">
-                <a:solidFill>
-                  <a:schemeClr val="lt1"/>
-                </a:solidFill>
-                <a:latin typeface="+mn-lt"/>
-                <a:ea typeface="+mn-ea"/>
-                <a:cs typeface="+mn-cs"/>
-              </a:defRPr>
-            </a:lvl8pPr>
-            <a:lvl9pPr marL="3657600" algn="l" defTabSz="914400" rtl="0" eaLnBrk="1" latinLnBrk="0" hangingPunct="1">
-              <a:defRPr sz="1800" kern="1200">
-                <a:solidFill>
-                  <a:schemeClr val="lt1"/>
-                </a:solidFill>
-                <a:latin typeface="+mn-lt"/>
-                <a:ea typeface="+mn-ea"/>
-                <a:cs typeface="+mn-cs"/>
-              </a:defRPr>
-            </a:lvl9pPr>
-          </a:lstStyle>
-          <a:p>
-            <a:pPr algn="ctr"/>
-            <a:r>
-              <a:rPr lang="en-US" sz="1200" dirty="0"/>
-              <a:t>CBNAAT</a:t>
-            </a:r>
-          </a:p>
-        </p:txBody>
-      </p:sp>
-      <p:sp>
-        <p:nvSpPr>
-          <p:cNvPr id="49" name="Rectangle 48">
-            <a:extLst>
-              <a:ext uri="{FF2B5EF4-FFF2-40B4-BE49-F238E27FC236}">
-                <a16:creationId xmlns:a16="http://schemas.microsoft.com/office/drawing/2014/main" id="{4E6ADE01-1BBD-6BCD-870F-D931F278E495}"/>
-              </a:ext>
-            </a:extLst>
-          </p:cNvPr>
-          <p:cNvSpPr/>
-          <p:nvPr/>
-        </p:nvSpPr>
-        <p:spPr>
-          <a:xfrm>
-            <a:off x="2993886" y="3478231"/>
-            <a:ext cx="901936" cy="361112"/>
-          </a:xfrm>
-          <a:prstGeom prst="rect">
-            <a:avLst/>
-          </a:prstGeom>
-        </p:spPr>
-        <p:style>
-          <a:lnRef idx="2">
-            <a:schemeClr val="accent1">
-              <a:shade val="15000"/>
-            </a:schemeClr>
-          </a:lnRef>
-          <a:fillRef idx="1">
-            <a:schemeClr val="accent1"/>
-          </a:fillRef>
-          <a:effectRef idx="0">
-            <a:schemeClr val="accent1"/>
-          </a:effectRef>
-          <a:fontRef idx="minor">
-            <a:schemeClr val="lt1"/>
-          </a:fontRef>
-        </p:style>
-        <p:txBody>
-          <a:bodyPr rtlCol="0" anchor="ctr"/>
-          <a:lstStyle>
-            <a:defPPr>
-              <a:defRPr lang="en-US"/>
-            </a:defPPr>
-            <a:lvl1pPr marL="0" algn="l" defTabSz="914400" rtl="0" eaLnBrk="1" latinLnBrk="0" hangingPunct="1">
-              <a:defRPr sz="1800" kern="1200">
-                <a:solidFill>
-                  <a:schemeClr val="lt1"/>
-                </a:solidFill>
-                <a:latin typeface="+mn-lt"/>
-                <a:ea typeface="+mn-ea"/>
-                <a:cs typeface="+mn-cs"/>
-              </a:defRPr>
-            </a:lvl1pPr>
-            <a:lvl2pPr marL="457200" algn="l" defTabSz="914400" rtl="0" eaLnBrk="1" latinLnBrk="0" hangingPunct="1">
-              <a:defRPr sz="1800" kern="1200">
-                <a:solidFill>
-                  <a:schemeClr val="lt1"/>
-                </a:solidFill>
-                <a:latin typeface="+mn-lt"/>
-                <a:ea typeface="+mn-ea"/>
-                <a:cs typeface="+mn-cs"/>
-              </a:defRPr>
-            </a:lvl2pPr>
-            <a:lvl3pPr marL="914400" algn="l" defTabSz="914400" rtl="0" eaLnBrk="1" latinLnBrk="0" hangingPunct="1">
-              <a:defRPr sz="1800" kern="1200">
-                <a:solidFill>
-                  <a:schemeClr val="lt1"/>
-                </a:solidFill>
-                <a:latin typeface="+mn-lt"/>
-                <a:ea typeface="+mn-ea"/>
-                <a:cs typeface="+mn-cs"/>
-              </a:defRPr>
-            </a:lvl3pPr>
-            <a:lvl4pPr marL="1371600" algn="l" defTabSz="914400" rtl="0" eaLnBrk="1" latinLnBrk="0" hangingPunct="1">
-              <a:defRPr sz="1800" kern="1200">
-                <a:solidFill>
-                  <a:schemeClr val="lt1"/>
-                </a:solidFill>
-                <a:latin typeface="+mn-lt"/>
-                <a:ea typeface="+mn-ea"/>
-                <a:cs typeface="+mn-cs"/>
-              </a:defRPr>
-            </a:lvl4pPr>
-            <a:lvl5pPr marL="1828800" algn="l" defTabSz="914400" rtl="0" eaLnBrk="1" latinLnBrk="0" hangingPunct="1">
-              <a:defRPr sz="1800" kern="1200">
-                <a:solidFill>
-                  <a:schemeClr val="lt1"/>
-                </a:solidFill>
-                <a:latin typeface="+mn-lt"/>
-                <a:ea typeface="+mn-ea"/>
-                <a:cs typeface="+mn-cs"/>
-              </a:defRPr>
-            </a:lvl5pPr>
-            <a:lvl6pPr marL="2286000" algn="l" defTabSz="914400" rtl="0" eaLnBrk="1" latinLnBrk="0" hangingPunct="1">
-              <a:defRPr sz="1800" kern="1200">
-                <a:solidFill>
-                  <a:schemeClr val="lt1"/>
-                </a:solidFill>
-                <a:latin typeface="+mn-lt"/>
-                <a:ea typeface="+mn-ea"/>
-                <a:cs typeface="+mn-cs"/>
-              </a:defRPr>
-            </a:lvl6pPr>
-            <a:lvl7pPr marL="2743200" algn="l" defTabSz="914400" rtl="0" eaLnBrk="1" latinLnBrk="0" hangingPunct="1">
-              <a:defRPr sz="1800" kern="1200">
-                <a:solidFill>
-                  <a:schemeClr val="lt1"/>
-                </a:solidFill>
-                <a:latin typeface="+mn-lt"/>
-                <a:ea typeface="+mn-ea"/>
-                <a:cs typeface="+mn-cs"/>
-              </a:defRPr>
-            </a:lvl7pPr>
-            <a:lvl8pPr marL="3200400" algn="l" defTabSz="914400" rtl="0" eaLnBrk="1" latinLnBrk="0" hangingPunct="1">
-              <a:defRPr sz="1800" kern="1200">
-                <a:solidFill>
-                  <a:schemeClr val="lt1"/>
-                </a:solidFill>
-                <a:latin typeface="+mn-lt"/>
-                <a:ea typeface="+mn-ea"/>
-                <a:cs typeface="+mn-cs"/>
-              </a:defRPr>
-            </a:lvl8pPr>
-            <a:lvl9pPr marL="3657600" algn="l" defTabSz="914400" rtl="0" eaLnBrk="1" latinLnBrk="0" hangingPunct="1">
-              <a:defRPr sz="1800" kern="1200">
-                <a:solidFill>
-                  <a:schemeClr val="lt1"/>
-                </a:solidFill>
-                <a:latin typeface="+mn-lt"/>
-                <a:ea typeface="+mn-ea"/>
-                <a:cs typeface="+mn-cs"/>
-              </a:defRPr>
-            </a:lvl9pPr>
-          </a:lstStyle>
-          <a:p>
-            <a:pPr algn="ctr"/>
-            <a:r>
-              <a:rPr lang="en-US" sz="1200" dirty="0"/>
-              <a:t>Sample</a:t>
-            </a:r>
-          </a:p>
-        </p:txBody>
-      </p:sp>
-      <p:cxnSp>
-        <p:nvCxnSpPr>
-          <p:cNvPr id="53" name="Straight Arrow Connector 52">
-            <a:extLst>
-              <a:ext uri="{FF2B5EF4-FFF2-40B4-BE49-F238E27FC236}">
-                <a16:creationId xmlns:a16="http://schemas.microsoft.com/office/drawing/2014/main" id="{E5A2F908-7466-3809-B71C-62515F13FB1E}"/>
-              </a:ext>
-            </a:extLst>
-          </p:cNvPr>
-          <p:cNvCxnSpPr>
-            <a:cxnSpLocks/>
-            <a:stCxn id="49" idx="3"/>
-            <a:endCxn id="47" idx="1"/>
-          </p:cNvCxnSpPr>
-          <p:nvPr/>
-        </p:nvCxnSpPr>
-        <p:spPr>
-          <a:xfrm>
-            <a:off x="3895822" y="3658787"/>
-            <a:ext cx="2110039" cy="0"/>
-          </a:xfrm>
-          <a:prstGeom prst="straightConnector1">
-            <a:avLst/>
-          </a:prstGeom>
-          <a:ln>
-            <a:tailEnd type="triangle"/>
-          </a:ln>
-        </p:spPr>
-        <p:style>
-          <a:lnRef idx="1">
-            <a:schemeClr val="accent6"/>
-          </a:lnRef>
-          <a:fillRef idx="0">
-            <a:schemeClr val="accent6"/>
-          </a:fillRef>
-          <a:effectRef idx="0">
-            <a:schemeClr val="accent6"/>
-          </a:effectRef>
-          <a:fontRef idx="minor">
-            <a:schemeClr val="tx1"/>
-          </a:fontRef>
-        </p:style>
-      </p:cxnSp>
-      <p:cxnSp>
-        <p:nvCxnSpPr>
-          <p:cNvPr id="54" name="Connector: Elbow 53">
-            <a:extLst>
-              <a:ext uri="{FF2B5EF4-FFF2-40B4-BE49-F238E27FC236}">
-                <a16:creationId xmlns:a16="http://schemas.microsoft.com/office/drawing/2014/main" id="{9A1DFE98-33E3-8CED-6E66-9B5413A3E3F4}"/>
-              </a:ext>
-            </a:extLst>
-          </p:cNvPr>
-          <p:cNvCxnSpPr>
-            <a:cxnSpLocks/>
-            <a:stCxn id="49" idx="2"/>
-          </p:cNvCxnSpPr>
-          <p:nvPr/>
-        </p:nvCxnSpPr>
-        <p:spPr>
-          <a:xfrm rot="16200000" flipH="1">
-            <a:off x="5194607" y="2089590"/>
-            <a:ext cx="519595" cy="4019100"/>
-          </a:xfrm>
-          <a:prstGeom prst="bentConnector2">
-            <a:avLst/>
-          </a:prstGeom>
-          <a:ln>
-            <a:tailEnd type="triangle"/>
-          </a:ln>
-        </p:spPr>
-        <p:style>
-          <a:lnRef idx="1">
-            <a:schemeClr val="accent2"/>
-          </a:lnRef>
-          <a:fillRef idx="0">
-            <a:schemeClr val="accent2"/>
-          </a:fillRef>
-          <a:effectRef idx="0">
-            <a:schemeClr val="accent2"/>
-          </a:effectRef>
-          <a:fontRef idx="minor">
-            <a:schemeClr val="tx1"/>
-          </a:fontRef>
-        </p:style>
-      </p:cxnSp>
-      <p:cxnSp>
-        <p:nvCxnSpPr>
-          <p:cNvPr id="55" name="Straight Arrow Connector 54">
-            <a:extLst>
-              <a:ext uri="{FF2B5EF4-FFF2-40B4-BE49-F238E27FC236}">
-                <a16:creationId xmlns:a16="http://schemas.microsoft.com/office/drawing/2014/main" id="{0CC28CF4-4AF7-4EB0-EE10-6CFC0A76B40B}"/>
-              </a:ext>
-            </a:extLst>
-          </p:cNvPr>
-          <p:cNvCxnSpPr>
-            <a:cxnSpLocks/>
-            <a:stCxn id="47" idx="3"/>
-          </p:cNvCxnSpPr>
-          <p:nvPr/>
-        </p:nvCxnSpPr>
-        <p:spPr>
-          <a:xfrm>
-            <a:off x="6907797" y="3658787"/>
-            <a:ext cx="556157" cy="0"/>
-          </a:xfrm>
-          <a:prstGeom prst="straightConnector1">
-            <a:avLst/>
-          </a:prstGeom>
-          <a:ln>
-            <a:tailEnd type="triangle"/>
-          </a:ln>
-        </p:spPr>
-        <p:style>
-          <a:lnRef idx="1">
-            <a:schemeClr val="accent6"/>
-          </a:lnRef>
-          <a:fillRef idx="0">
-            <a:schemeClr val="accent6"/>
-          </a:fillRef>
-          <a:effectRef idx="0">
-            <a:schemeClr val="accent6"/>
-          </a:effectRef>
-          <a:fontRef idx="minor">
-            <a:schemeClr val="tx1"/>
-          </a:fontRef>
-        </p:style>
-      </p:cxnSp>
-      <p:cxnSp>
-        <p:nvCxnSpPr>
-          <p:cNvPr id="56" name="Connector: Elbow 55">
-            <a:extLst>
-              <a:ext uri="{FF2B5EF4-FFF2-40B4-BE49-F238E27FC236}">
-                <a16:creationId xmlns:a16="http://schemas.microsoft.com/office/drawing/2014/main" id="{D73085EC-C83E-B409-D1DF-C4321E7F4931}"/>
-              </a:ext>
-            </a:extLst>
-          </p:cNvPr>
-          <p:cNvCxnSpPr>
-            <a:cxnSpLocks/>
-            <a:stCxn id="47" idx="2"/>
-          </p:cNvCxnSpPr>
-          <p:nvPr/>
-        </p:nvCxnSpPr>
-        <p:spPr>
-          <a:xfrm rot="16200000" flipH="1">
-            <a:off x="6870114" y="3426057"/>
-            <a:ext cx="180556" cy="1007127"/>
-          </a:xfrm>
-          <a:prstGeom prst="bentConnector2">
-            <a:avLst/>
-          </a:prstGeom>
-          <a:ln>
-            <a:tailEnd type="triangle"/>
-          </a:ln>
-        </p:spPr>
-        <p:style>
-          <a:lnRef idx="1">
-            <a:schemeClr val="accent2"/>
-          </a:lnRef>
-          <a:fillRef idx="0">
-            <a:schemeClr val="accent2"/>
-          </a:fillRef>
-          <a:effectRef idx="0">
-            <a:schemeClr val="accent2"/>
-          </a:effectRef>
-          <a:fontRef idx="minor">
-            <a:schemeClr val="tx1"/>
-          </a:fontRef>
-        </p:style>
-      </p:cxnSp>
-      <mc:AlternateContent xmlns:mc="http://schemas.openxmlformats.org/markup-compatibility/2006">
-        <mc:Choice xmlns:a14="http://schemas.microsoft.com/office/drawing/2010/main" Requires="a14">
-          <p:sp>
-            <p:nvSpPr>
-              <p:cNvPr id="57" name="TextBox 56">
-                <a:extLst>
-                  <a:ext uri="{FF2B5EF4-FFF2-40B4-BE49-F238E27FC236}">
-                    <a16:creationId xmlns:a16="http://schemas.microsoft.com/office/drawing/2014/main" id="{387FF9CF-809C-F257-A9D6-F38CCB310669}"/>
-                  </a:ext>
-                </a:extLst>
-              </p:cNvPr>
-              <p:cNvSpPr txBox="1"/>
-              <p:nvPr/>
-            </p:nvSpPr>
-            <p:spPr>
-              <a:xfrm>
-                <a:off x="3214783" y="4096197"/>
-                <a:ext cx="1362075" cy="291298"/>
-              </a:xfrm>
-              <a:prstGeom prst="rect">
-                <a:avLst/>
-              </a:prstGeom>
-              <a:noFill/>
-            </p:spPr>
-            <p:txBody>
-              <a:bodyPr wrap="square">
-                <a:spAutoFit/>
-              </a:bodyPr>
-              <a:lstStyle/>
-              <a:p>
-                <a:pPr/>
-                <a14:m>
-                  <m:oMathPara xmlns:m="http://schemas.openxmlformats.org/officeDocument/2006/math">
-                    <m:oMathParaPr>
-                      <m:jc m:val="centerGroup"/>
-                    </m:oMathParaPr>
-                    <m:oMath xmlns:m="http://schemas.openxmlformats.org/officeDocument/2006/math">
-                      <m:sSub>
-                        <m:sSubPr>
-                          <m:ctrlPr>
-                            <a:rPr lang="en-GB" sz="1200" b="0" i="1" smtClean="0">
-                              <a:latin typeface="Cambria Math" panose="02040503050406030204" pitchFamily="18" charset="0"/>
-                            </a:rPr>
-                          </m:ctrlPr>
-                        </m:sSubPr>
-                        <m:e>
                           <m:r>
                             <a:rPr lang="en-GB" sz="1200" b="0" i="1" smtClean="0">
                               <a:latin typeface="Cambria Math" panose="02040503050406030204" pitchFamily="18" charset="0"/>
                             </a:rPr>
-                            <m:t>1−</m:t>
+                            <m:t>,</m:t>
                           </m:r>
                           <m:r>
                             <a:rPr lang="en-GB" sz="1200" b="0" i="1" smtClean="0">
                               <a:latin typeface="Cambria Math" panose="02040503050406030204" pitchFamily="18" charset="0"/>
                             </a:rPr>
-                            <m:t>𝑃</m:t>
-                          </m:r>
-                        </m:e>
-                        <m:sub>
-                          <m:r>
-                            <a:rPr lang="en-GB" sz="1200" b="0" i="1" smtClean="0">
-                              <a:latin typeface="Cambria Math" panose="02040503050406030204" pitchFamily="18" charset="0"/>
-                            </a:rPr>
-                            <m:t>𝑠𝑝𝑢𝑡𝑢𝑚</m:t>
+                            <m:t>𝐶𝐵𝑁</m:t>
                           </m:r>
                         </m:sub>
                       </m:sSub>
@@ -42438,7 +42506,7 @@
             </p:nvSpPr>
             <p:spPr>
               <a:xfrm>
-                <a:off x="3214783" y="4096197"/>
+                <a:off x="3444853" y="4089543"/>
                 <a:ext cx="1362075" cy="291298"/>
               </a:xfrm>
               <a:prstGeom prst="rect">
@@ -42506,7 +42574,7 @@
                       <m:sSub>
                         <m:sSubPr>
                           <m:ctrlPr>
-                            <a:rPr lang="en-GB" sz="1200" i="1">
+                            <a:rPr lang="en-GB" sz="1200" i="1" smtClean="0">
                               <a:latin typeface="Cambria Math" panose="02040503050406030204" pitchFamily="18" charset="0"/>
                             </a:rPr>
                           </m:ctrlPr>
@@ -42525,6 +42593,24 @@
                               <a:latin typeface="Cambria Math" panose="02040503050406030204" pitchFamily="18" charset="0"/>
                             </a:rPr>
                             <m:t>𝑠𝑝𝑢𝑡𝑢𝑚</m:t>
+                          </m:r>
+                          <m:r>
+                            <a:rPr lang="en-GB" sz="1200" b="0" i="1" smtClean="0">
+                              <a:latin typeface="Cambria Math" panose="02040503050406030204" pitchFamily="18" charset="0"/>
+                            </a:rPr>
+                            <m:t>,</m:t>
+                          </m:r>
+                          <m:r>
+                            <a:rPr lang="en-GB" sz="1200" b="0" i="1" smtClean="0">
+                              <a:latin typeface="Cambria Math" panose="02040503050406030204" pitchFamily="18" charset="0"/>
+                            </a:rPr>
+                            <m:t>𝐶𝐵</m:t>
+                          </m:r>
+                          <m:r>
+                            <a:rPr lang="en-GB" sz="1200" b="0" i="1" smtClean="0">
+                              <a:latin typeface="Cambria Math" panose="02040503050406030204" pitchFamily="18" charset="0"/>
+                            </a:rPr>
+                            <m:t>𝑁</m:t>
                           </m:r>
                         </m:sub>
                       </m:sSub>
@@ -42562,7 +42648,7 @@
               <a:blipFill>
                 <a:blip r:embed="rId5"/>
                 <a:stretch>
-                  <a:fillRect/>
+                  <a:fillRect r="-33028"/>
                 </a:stretch>
               </a:blipFill>
             </p:spPr>
@@ -42750,7 +42836,7 @@
         </p:nvSpPr>
         <p:spPr>
           <a:xfrm>
-            <a:off x="4459161" y="2003296"/>
+            <a:off x="4715692" y="2010482"/>
             <a:ext cx="901936" cy="361112"/>
           </a:xfrm>
           <a:prstGeom prst="rect">
@@ -43039,7 +43125,7 @@
         </p:nvCxnSpPr>
         <p:spPr>
           <a:xfrm rot="5400000" flipH="1" flipV="1">
-            <a:off x="6081735" y="621078"/>
+            <a:off x="6338266" y="628264"/>
             <a:ext cx="210612" cy="2553825"/>
           </a:xfrm>
           <a:prstGeom prst="bentConnector2">
@@ -43083,7 +43169,7 @@
         <p:spPr>
           <a:xfrm>
             <a:off x="3895822" y="2183852"/>
-            <a:ext cx="563339" cy="0"/>
+            <a:ext cx="819870" cy="7186"/>
           </a:xfrm>
           <a:prstGeom prst="straightConnector1">
             <a:avLst/>
@@ -43166,7 +43252,7 @@
         </p:nvCxnSpPr>
         <p:spPr>
           <a:xfrm rot="16200000" flipH="1">
-            <a:off x="6096764" y="1177773"/>
+            <a:off x="6353295" y="1184959"/>
             <a:ext cx="180556" cy="2553826"/>
           </a:xfrm>
           <a:prstGeom prst="bentConnector2">
@@ -43191,8 +43277,8 @@
           </a:fontRef>
         </p:style>
       </p:cxnSp>
-      <mc:AlternateContent xmlns:mc="http://schemas.openxmlformats.org/markup-compatibility/2006">
-        <mc:Choice xmlns:a14="http://schemas.microsoft.com/office/drawing/2010/main" Requires="a14">
+      <mc:AlternateContent xmlns:mc="http://schemas.openxmlformats.org/markup-compatibility/2006" xmlns:a14="http://schemas.microsoft.com/office/drawing/2010/main">
+        <mc:Choice Requires="a14">
           <p:sp>
             <p:nvSpPr>
               <p:cNvPr id="463" name="TextBox 462">
@@ -43207,7 +43293,7 @@
             </p:nvSpPr>
             <p:spPr>
               <a:xfrm>
-                <a:off x="3214783" y="2621262"/>
+                <a:off x="3439010" y="2628448"/>
                 <a:ext cx="1362075" cy="291298"/>
               </a:xfrm>
               <a:prstGeom prst="rect">
@@ -43255,7 +43341,19 @@
                             <a:rPr lang="en-GB" sz="1200" b="0" i="1" smtClean="0">
                               <a:latin typeface="Cambria Math" panose="02040503050406030204" pitchFamily="18" charset="0"/>
                             </a:rPr>
-                            <m:t>𝑠𝑝𝑢𝑡𝑢𝑚</m:t>
+                            <m:t>𝑠𝑎𝑚𝑝𝑙𝑒</m:t>
+                          </m:r>
+                          <m:r>
+                            <a:rPr lang="en-GB" sz="1200" b="0" i="1" smtClean="0">
+                              <a:latin typeface="Cambria Math" panose="02040503050406030204" pitchFamily="18" charset="0"/>
+                            </a:rPr>
+                            <m:t>,</m:t>
+                          </m:r>
+                          <m:r>
+                            <a:rPr lang="en-GB" sz="1200" b="0" i="1" smtClean="0">
+                              <a:latin typeface="Cambria Math" panose="02040503050406030204" pitchFamily="18" charset="0"/>
+                            </a:rPr>
+                            <m:t>𝑆𝑆𝑀</m:t>
                           </m:r>
                         </m:sub>
                       </m:sSub>
@@ -43267,7 +43365,7 @@
             </p:txBody>
           </p:sp>
         </mc:Choice>
-        <mc:Fallback>
+        <mc:Fallback xmlns="">
           <p:sp>
             <p:nvSpPr>
               <p:cNvPr id="463" name="TextBox 462">
@@ -43284,14 +43382,14 @@
             </p:nvSpPr>
             <p:spPr>
               <a:xfrm>
-                <a:off x="3214783" y="2621262"/>
+                <a:off x="3439010" y="2628448"/>
                 <a:ext cx="1362075" cy="291298"/>
               </a:xfrm>
               <a:prstGeom prst="rect">
                 <a:avLst/>
               </a:prstGeom>
               <a:blipFill>
-                <a:blip r:embed="rId6"/>
+                <a:blip r:embed="rId2"/>
                 <a:stretch>
                   <a:fillRect/>
                 </a:stretch>
@@ -43312,8 +43410,8 @@
           </p:sp>
         </mc:Fallback>
       </mc:AlternateContent>
-      <mc:AlternateContent xmlns:mc="http://schemas.openxmlformats.org/markup-compatibility/2006">
-        <mc:Choice xmlns:a14="http://schemas.microsoft.com/office/drawing/2010/main" Requires="a14">
+      <mc:AlternateContent xmlns:mc="http://schemas.openxmlformats.org/markup-compatibility/2006" xmlns:a14="http://schemas.microsoft.com/office/drawing/2010/main">
+        <mc:Choice Requires="a14">
           <p:sp>
             <p:nvSpPr>
               <p:cNvPr id="464" name="TextBox 463">
@@ -43352,7 +43450,7 @@
                       <m:sSub>
                         <m:sSubPr>
                           <m:ctrlPr>
-                            <a:rPr lang="en-GB" sz="1200" i="1">
+                            <a:rPr lang="en-GB" sz="1200" i="1" smtClean="0">
                               <a:latin typeface="Cambria Math" panose="02040503050406030204" pitchFamily="18" charset="0"/>
                             </a:rPr>
                           </m:ctrlPr>
@@ -43370,7 +43468,25 @@
                             <a:rPr lang="en-GB" sz="1200" i="1">
                               <a:latin typeface="Cambria Math" panose="02040503050406030204" pitchFamily="18" charset="0"/>
                             </a:rPr>
-                            <m:t>𝑠𝑝𝑢𝑡𝑢𝑚</m:t>
+                            <m:t>𝑠</m:t>
+                          </m:r>
+                          <m:r>
+                            <a:rPr lang="en-GB" sz="1200" b="0" i="1" smtClean="0">
+                              <a:latin typeface="Cambria Math" panose="02040503050406030204" pitchFamily="18" charset="0"/>
+                            </a:rPr>
+                            <m:t>𝑎𝑚𝑝𝑙𝑒</m:t>
+                          </m:r>
+                          <m:r>
+                            <a:rPr lang="en-GB" sz="1200" b="0" i="1" smtClean="0">
+                              <a:latin typeface="Cambria Math" panose="02040503050406030204" pitchFamily="18" charset="0"/>
+                            </a:rPr>
+                            <m:t>, </m:t>
+                          </m:r>
+                          <m:r>
+                            <a:rPr lang="en-GB" sz="1200" b="0" i="1" smtClean="0">
+                              <a:latin typeface="Cambria Math" panose="02040503050406030204" pitchFamily="18" charset="0"/>
+                            </a:rPr>
+                            <m:t>𝑆𝑆𝑀</m:t>
                           </m:r>
                         </m:sub>
                       </m:sSub>
@@ -43382,7 +43498,7 @@
             </p:txBody>
           </p:sp>
         </mc:Choice>
-        <mc:Fallback>
+        <mc:Fallback xmlns="">
           <p:sp>
             <p:nvSpPr>
               <p:cNvPr id="464" name="TextBox 463">
@@ -43406,9 +43522,9 @@
                 <a:avLst/>
               </a:prstGeom>
               <a:blipFill>
-                <a:blip r:embed="rId5"/>
+                <a:blip r:embed="rId6"/>
                 <a:stretch>
-                  <a:fillRect/>
+                  <a:fillRect r="-28440"/>
                 </a:stretch>
               </a:blipFill>
             </p:spPr>
@@ -43654,8 +43770,8 @@
           </a:fontRef>
         </p:style>
       </p:cxnSp>
-      <mc:AlternateContent xmlns:mc="http://schemas.openxmlformats.org/markup-compatibility/2006">
-        <mc:Choice xmlns:a14="http://schemas.microsoft.com/office/drawing/2010/main" Requires="a14">
+      <mc:AlternateContent xmlns:mc="http://schemas.openxmlformats.org/markup-compatibility/2006" xmlns:a14="http://schemas.microsoft.com/office/drawing/2010/main">
+        <mc:Choice Requires="a14">
           <p:sp>
             <p:nvSpPr>
               <p:cNvPr id="480" name="TextBox 479">
@@ -43767,7 +43883,7 @@
             </p:txBody>
           </p:sp>
         </mc:Choice>
-        <mc:Fallback>
+        <mc:Fallback xmlns="">
           <p:sp>
             <p:nvSpPr>
               <p:cNvPr id="480" name="TextBox 479">
@@ -43812,8 +43928,8 @@
           </p:sp>
         </mc:Fallback>
       </mc:AlternateContent>
-      <mc:AlternateContent xmlns:mc="http://schemas.openxmlformats.org/markup-compatibility/2006">
-        <mc:Choice xmlns:a14="http://schemas.microsoft.com/office/drawing/2010/main" Requires="a14">
+      <mc:AlternateContent xmlns:mc="http://schemas.openxmlformats.org/markup-compatibility/2006" xmlns:a14="http://schemas.microsoft.com/office/drawing/2010/main">
+        <mc:Choice Requires="a14">
           <p:sp>
             <p:nvSpPr>
               <p:cNvPr id="481" name="TextBox 480">
@@ -43907,7 +44023,7 @@
             </p:txBody>
           </p:sp>
         </mc:Choice>
-        <mc:Fallback>
+        <mc:Fallback xmlns="">
           <p:sp>
             <p:nvSpPr>
               <p:cNvPr id="481" name="TextBox 480">
@@ -43952,8 +44068,8 @@
           </p:sp>
         </mc:Fallback>
       </mc:AlternateContent>
-      <mc:AlternateContent xmlns:mc="http://schemas.openxmlformats.org/markup-compatibility/2006">
-        <mc:Choice xmlns:a14="http://schemas.microsoft.com/office/drawing/2010/main" Requires="a14">
+      <mc:AlternateContent xmlns:mc="http://schemas.openxmlformats.org/markup-compatibility/2006" xmlns:a14="http://schemas.microsoft.com/office/drawing/2010/main">
+        <mc:Choice Requires="a14">
           <p:sp>
             <p:nvSpPr>
               <p:cNvPr id="482" name="TextBox 481">
@@ -44059,7 +44175,7 @@
             </p:txBody>
           </p:sp>
         </mc:Choice>
-        <mc:Fallback>
+        <mc:Fallback xmlns="">
           <p:sp>
             <p:nvSpPr>
               <p:cNvPr id="482" name="TextBox 481">
@@ -44104,55 +44220,134 @@
           </p:sp>
         </mc:Fallback>
       </mc:AlternateContent>
-      <p:sp>
-        <p:nvSpPr>
-          <p:cNvPr id="484" name="Rectangle 483">
-            <a:extLst>
-              <a:ext uri="{FF2B5EF4-FFF2-40B4-BE49-F238E27FC236}">
-                <a16:creationId xmlns:a16="http://schemas.microsoft.com/office/drawing/2014/main" id="{1910759A-CF28-7D60-C5F0-1A83DE6C3B74}"/>
-              </a:ext>
-            </a:extLst>
-          </p:cNvPr>
-          <p:cNvSpPr/>
-          <p:nvPr/>
-        </p:nvSpPr>
-        <p:spPr>
-          <a:xfrm rot="16200000">
-            <a:off x="-1483758" y="3500193"/>
-            <a:ext cx="4463851" cy="617923"/>
-          </a:xfrm>
-          <a:prstGeom prst="rect">
-            <a:avLst/>
-          </a:prstGeom>
-        </p:spPr>
-        <p:style>
-          <a:lnRef idx="2">
-            <a:schemeClr val="accent6"/>
-          </a:lnRef>
-          <a:fillRef idx="1">
-            <a:schemeClr val="lt1"/>
-          </a:fillRef>
-          <a:effectRef idx="0">
-            <a:schemeClr val="accent6"/>
-          </a:effectRef>
-          <a:fontRef idx="minor">
-            <a:schemeClr val="dk1"/>
-          </a:fontRef>
-        </p:style>
-        <p:txBody>
-          <a:bodyPr rtlCol="0" anchor="ctr"/>
-          <a:lstStyle/>
-          <a:p>
-            <a:pPr algn="ctr"/>
-            <a:r>
-              <a:rPr lang="en-GB" dirty="0"/>
-              <a:t>Test available</a:t>
-            </a:r>
-          </a:p>
-        </p:txBody>
-      </p:sp>
-      <mc:AlternateContent xmlns:mc="http://schemas.openxmlformats.org/markup-compatibility/2006">
-        <mc:Choice xmlns:a14="http://schemas.microsoft.com/office/drawing/2010/main" Requires="a14">
+      <mc:AlternateContent xmlns:mc="http://schemas.openxmlformats.org/markup-compatibility/2006" xmlns:a14="http://schemas.microsoft.com/office/drawing/2010/main">
+        <mc:Choice Requires="a14">
+          <p:sp>
+            <p:nvSpPr>
+              <p:cNvPr id="484" name="Rectangle 483">
+                <a:extLst>
+                  <a:ext uri="{FF2B5EF4-FFF2-40B4-BE49-F238E27FC236}">
+                    <a16:creationId xmlns:a16="http://schemas.microsoft.com/office/drawing/2014/main" id="{1910759A-CF28-7D60-C5F0-1A83DE6C3B74}"/>
+                  </a:ext>
+                </a:extLst>
+              </p:cNvPr>
+              <p:cNvSpPr/>
+              <p:nvPr/>
+            </p:nvSpPr>
+            <p:spPr>
+              <a:xfrm>
+                <a:off x="327686" y="1801217"/>
+                <a:ext cx="737185" cy="3774030"/>
+              </a:xfrm>
+              <a:prstGeom prst="rect">
+                <a:avLst/>
+              </a:prstGeom>
+            </p:spPr>
+            <p:style>
+              <a:lnRef idx="2">
+                <a:schemeClr val="accent6"/>
+              </a:lnRef>
+              <a:fillRef idx="1">
+                <a:schemeClr val="lt1"/>
+              </a:fillRef>
+              <a:effectRef idx="0">
+                <a:schemeClr val="accent6"/>
+              </a:effectRef>
+              <a:fontRef idx="minor">
+                <a:schemeClr val="dk1"/>
+              </a:fontRef>
+            </p:style>
+            <p:txBody>
+              <a:bodyPr rtlCol="0" anchor="ctr"/>
+              <a:lstStyle/>
+              <a:p>
+                <a:pPr algn="ctr"/>
+                <a14:m>
+                  <m:oMathPara xmlns:m="http://schemas.openxmlformats.org/officeDocument/2006/math">
+                    <m:oMathParaPr>
+                      <m:jc m:val="centerGroup"/>
+                    </m:oMathParaPr>
+                    <m:oMath xmlns:m="http://schemas.openxmlformats.org/officeDocument/2006/math">
+                      <m:sSub>
+                        <m:sSubPr>
+                          <m:ctrlPr>
+                            <a:rPr lang="en-GB" b="0" i="1" smtClean="0">
+                              <a:latin typeface="Cambria Math" panose="02040503050406030204" pitchFamily="18" charset="0"/>
+                            </a:rPr>
+                          </m:ctrlPr>
+                        </m:sSubPr>
+                        <m:e>
+                          <m:r>
+                            <a:rPr lang="en-GB" b="0" i="1" smtClean="0">
+                              <a:latin typeface="Cambria Math" panose="02040503050406030204" pitchFamily="18" charset="0"/>
+                            </a:rPr>
+                            <m:t>𝑃</m:t>
+                          </m:r>
+                        </m:e>
+                        <m:sub>
+                          <m:r>
+                            <a:rPr lang="en-GB" b="0" i="1" smtClean="0">
+                              <a:latin typeface="Cambria Math" panose="02040503050406030204" pitchFamily="18" charset="0"/>
+                            </a:rPr>
+                            <m:t>2</m:t>
+                          </m:r>
+                        </m:sub>
+                      </m:sSub>
+                    </m:oMath>
+                  </m:oMathPara>
+                </a14:m>
+                <a:endParaRPr lang="en-GB" dirty="0"/>
+              </a:p>
+            </p:txBody>
+          </p:sp>
+        </mc:Choice>
+        <mc:Fallback xmlns="">
+          <p:sp>
+            <p:nvSpPr>
+              <p:cNvPr id="484" name="Rectangle 483">
+                <a:extLst>
+                  <a:ext uri="{FF2B5EF4-FFF2-40B4-BE49-F238E27FC236}">
+                    <a16:creationId xmlns:a16="http://schemas.microsoft.com/office/drawing/2014/main" id="{1910759A-CF28-7D60-C5F0-1A83DE6C3B74}"/>
+                  </a:ext>
+                </a:extLst>
+              </p:cNvPr>
+              <p:cNvSpPr>
+                <a:spLocks noRot="1" noChangeAspect="1" noMove="1" noResize="1" noEditPoints="1" noAdjustHandles="1" noChangeArrowheads="1" noChangeShapeType="1" noTextEdit="1"/>
+              </p:cNvSpPr>
+              <p:nvPr/>
+            </p:nvSpPr>
+            <p:spPr>
+              <a:xfrm>
+                <a:off x="327686" y="1801217"/>
+                <a:ext cx="737185" cy="3774030"/>
+              </a:xfrm>
+              <a:prstGeom prst="rect">
+                <a:avLst/>
+              </a:prstGeom>
+              <a:blipFill>
+                <a:blip r:embed="rId10"/>
+                <a:stretch>
+                  <a:fillRect/>
+                </a:stretch>
+              </a:blipFill>
+            </p:spPr>
+            <p:txBody>
+              <a:bodyPr/>
+              <a:lstStyle/>
+              <a:p>
+                <a:r>
+                  <a:rPr lang="en-GB">
+                    <a:noFill/>
+                  </a:rPr>
+                  <a:t> </a:t>
+                </a:r>
+              </a:p>
+            </p:txBody>
+          </p:sp>
+        </mc:Fallback>
+      </mc:AlternateContent>
+      <mc:AlternateContent xmlns:mc="http://schemas.openxmlformats.org/markup-compatibility/2006" xmlns:a14="http://schemas.microsoft.com/office/drawing/2010/main">
+        <mc:Choice Requires="a14">
           <p:sp>
             <p:nvSpPr>
               <p:cNvPr id="485" name="TextBox 484">
@@ -44181,7 +44376,6 @@
               </a:bodyPr>
               <a:lstStyle/>
               <a:p>
-                <a:pPr/>
                 <a:r>
                   <a:rPr lang="en-GB" sz="1200" b="0" dirty="0"/>
                   <a:t>*Test unavailable: </a:t>
@@ -44269,7 +44463,7 @@
             </p:txBody>
           </p:sp>
         </mc:Choice>
-        <mc:Fallback>
+        <mc:Fallback xmlns="">
           <p:sp>
             <p:nvSpPr>
               <p:cNvPr id="485" name="TextBox 484">
@@ -44293,7 +44487,7 @@
                 <a:avLst/>
               </a:prstGeom>
               <a:blipFill>
-                <a:blip r:embed="rId10"/>
+                <a:blip r:embed="rId11"/>
                 <a:stretch>
                   <a:fillRect l="-214" t="-2222" b="-17778"/>
                 </a:stretch>

</xml_diff>